<commit_message>
Update example storyboard template
Co-Authored-By: Claude Sonnet 4.6 <noreply@anthropic.com>
</commit_message>
<xml_diff>
--- a/Example-Storyboard-Analytics.pptx
+++ b/Example-Storyboard-Analytics.pptx
@@ -4,25 +4,21 @@
   <p:sldMasterIdLst>
     <p:sldMasterId id="2147483648" r:id="rId1"/>
   </p:sldMasterIdLst>
+  <p:notesMasterIdLst>
+    <p:notesMasterId r:id="rId11"/>
+  </p:notesMasterIdLst>
   <p:sldIdLst>
-    <p:sldId id="256" r:id="rId7"/>
-    <p:sldId id="257" r:id="rId8"/>
-    <p:sldId id="258" r:id="rId9"/>
-    <p:sldId id="259" r:id="rId10"/>
-    <p:sldId id="260" r:id="rId11"/>
-    <p:sldId id="261" r:id="rId12"/>
-    <p:sldId id="262" r:id="rId13"/>
-    <p:sldId id="263" r:id="rId14"/>
-    <p:sldId id="264" r:id="rId15"/>
-    <p:sldId id="265" r:id="rId16"/>
-    <p:sldId id="266" r:id="rId17"/>
-    <p:sldId id="267" r:id="rId18"/>
-    <p:sldId id="268" r:id="rId19"/>
-    <p:sldId id="269" r:id="rId20"/>
-    <p:sldId id="270" r:id="rId21"/>
-    <p:sldId id="271" r:id="rId22"/>
+    <p:sldId id="256" r:id="rId2"/>
+    <p:sldId id="257" r:id="rId3"/>
+    <p:sldId id="259" r:id="rId4"/>
+    <p:sldId id="260" r:id="rId5"/>
+    <p:sldId id="261" r:id="rId6"/>
+    <p:sldId id="262" r:id="rId7"/>
+    <p:sldId id="264" r:id="rId8"/>
+    <p:sldId id="266" r:id="rId9"/>
+    <p:sldId id="267" r:id="rId10"/>
   </p:sldIdLst>
-  <p:sldSz cx="12188952" cy="6858000" type="screen4x3"/>
+  <p:sldSz cx="12188825" cy="6858000"/>
   <p:notesSz cx="6858000" cy="9144000"/>
   <p:defaultTextStyle>
     <a:defPPr>
@@ -119,7 +115,456 @@
       </a:defRPr>
     </a:lvl9pPr>
   </p:defaultTextStyle>
+  <p:extLst>
+    <p:ext uri="{EFAFB233-063F-42B5-8137-9DF3F51BA10A}">
+      <p15:sldGuideLst xmlns:p15="http://schemas.microsoft.com/office/powerpoint/2012/main">
+        <p15:guide id="1" orient="horz" pos="2160">
+          <p15:clr>
+            <a:srgbClr val="A4A3A4"/>
+          </p15:clr>
+        </p15:guide>
+        <p15:guide id="2" pos="2880">
+          <p15:clr>
+            <a:srgbClr val="A4A3A4"/>
+          </p15:clr>
+        </p15:guide>
+      </p15:sldGuideLst>
+    </p:ext>
+  </p:extLst>
 </p:presentation>
+</file>
+
+<file path=ppt/notesMasters/notesMaster1.xml><?xml version="1.0" encoding="utf-8"?>
+<p:notesMaster xmlns:a="http://schemas.openxmlformats.org/drawingml/2006/main" xmlns:r="http://schemas.openxmlformats.org/officeDocument/2006/relationships" xmlns:p="http://schemas.openxmlformats.org/presentationml/2006/main">
+  <p:cSld>
+    <p:bg>
+      <p:bgRef idx="1001">
+        <a:schemeClr val="bg1"/>
+      </p:bgRef>
+    </p:bg>
+    <p:spTree>
+      <p:nvGrpSpPr>
+        <p:cNvPr id="1" name=""/>
+        <p:cNvGrpSpPr/>
+        <p:nvPr/>
+      </p:nvGrpSpPr>
+      <p:grpSpPr>
+        <a:xfrm>
+          <a:off x="0" y="0"/>
+          <a:ext cx="0" cy="0"/>
+          <a:chOff x="0" y="0"/>
+          <a:chExt cx="0" cy="0"/>
+        </a:xfrm>
+      </p:grpSpPr>
+      <p:sp>
+        <p:nvSpPr>
+          <p:cNvPr id="2" name="Header Placeholder 1"/>
+          <p:cNvSpPr>
+            <a:spLocks noGrp="1"/>
+          </p:cNvSpPr>
+          <p:nvPr>
+            <p:ph type="hdr" sz="quarter"/>
+          </p:nvPr>
+        </p:nvSpPr>
+        <p:spPr>
+          <a:xfrm>
+            <a:off x="0" y="0"/>
+            <a:ext cx="2971800" cy="458788"/>
+          </a:xfrm>
+          <a:prstGeom prst="rect">
+            <a:avLst/>
+          </a:prstGeom>
+        </p:spPr>
+        <p:txBody>
+          <a:bodyPr vert="horz" lIns="91440" tIns="45720" rIns="91440" bIns="45720" rtlCol="0"/>
+          <a:lstStyle>
+            <a:lvl1pPr algn="l">
+              <a:defRPr sz="1200"/>
+            </a:lvl1pPr>
+          </a:lstStyle>
+          <a:p>
+            <a:endParaRPr lang="en-US"/>
+          </a:p>
+        </p:txBody>
+      </p:sp>
+      <p:sp>
+        <p:nvSpPr>
+          <p:cNvPr id="3" name="Date Placeholder 2"/>
+          <p:cNvSpPr>
+            <a:spLocks noGrp="1"/>
+          </p:cNvSpPr>
+          <p:nvPr>
+            <p:ph type="dt" idx="1"/>
+          </p:nvPr>
+        </p:nvSpPr>
+        <p:spPr>
+          <a:xfrm>
+            <a:off x="3884613" y="0"/>
+            <a:ext cx="2971800" cy="458788"/>
+          </a:xfrm>
+          <a:prstGeom prst="rect">
+            <a:avLst/>
+          </a:prstGeom>
+        </p:spPr>
+        <p:txBody>
+          <a:bodyPr vert="horz" lIns="91440" tIns="45720" rIns="91440" bIns="45720" rtlCol="0"/>
+          <a:lstStyle>
+            <a:lvl1pPr algn="r">
+              <a:defRPr sz="1200"/>
+            </a:lvl1pPr>
+          </a:lstStyle>
+          <a:p>
+            <a:fld id="{3CE8137A-ED80-404D-975E-6C342ADC42AA}" type="datetimeFigureOut">
+              <a:rPr lang="en-US" smtClean="0"/>
+              <a:t>2/20/2026</a:t>
+            </a:fld>
+            <a:endParaRPr lang="en-US"/>
+          </a:p>
+        </p:txBody>
+      </p:sp>
+      <p:sp>
+        <p:nvSpPr>
+          <p:cNvPr id="4" name="Slide Image Placeholder 3"/>
+          <p:cNvSpPr>
+            <a:spLocks noGrp="1" noRot="1" noChangeAspect="1"/>
+          </p:cNvSpPr>
+          <p:nvPr>
+            <p:ph type="sldImg" idx="2"/>
+          </p:nvPr>
+        </p:nvSpPr>
+        <p:spPr>
+          <a:xfrm>
+            <a:off x="685800" y="1143000"/>
+            <a:ext cx="5486400" cy="3086100"/>
+          </a:xfrm>
+          <a:prstGeom prst="rect">
+            <a:avLst/>
+          </a:prstGeom>
+          <a:noFill/>
+          <a:ln w="12700">
+            <a:solidFill>
+              <a:prstClr val="black"/>
+            </a:solidFill>
+          </a:ln>
+        </p:spPr>
+        <p:txBody>
+          <a:bodyPr vert="horz" lIns="91440" tIns="45720" rIns="91440" bIns="45720" rtlCol="0" anchor="ctr"/>
+          <a:lstStyle/>
+          <a:p>
+            <a:endParaRPr lang="en-US"/>
+          </a:p>
+        </p:txBody>
+      </p:sp>
+      <p:sp>
+        <p:nvSpPr>
+          <p:cNvPr id="5" name="Notes Placeholder 4"/>
+          <p:cNvSpPr>
+            <a:spLocks noGrp="1"/>
+          </p:cNvSpPr>
+          <p:nvPr>
+            <p:ph type="body" sz="quarter" idx="3"/>
+          </p:nvPr>
+        </p:nvSpPr>
+        <p:spPr>
+          <a:xfrm>
+            <a:off x="685800" y="4400550"/>
+            <a:ext cx="5486400" cy="3600450"/>
+          </a:xfrm>
+          <a:prstGeom prst="rect">
+            <a:avLst/>
+          </a:prstGeom>
+        </p:spPr>
+        <p:txBody>
+          <a:bodyPr vert="horz" lIns="91440" tIns="45720" rIns="91440" bIns="45720" rtlCol="0"/>
+          <a:lstStyle/>
+          <a:p>
+            <a:pPr lvl="0"/>
+            <a:r>
+              <a:rPr lang="en-US"/>
+              <a:t>Click to edit Master text styles</a:t>
+            </a:r>
+          </a:p>
+          <a:p>
+            <a:pPr lvl="1"/>
+            <a:r>
+              <a:rPr lang="en-US"/>
+              <a:t>Second level</a:t>
+            </a:r>
+          </a:p>
+          <a:p>
+            <a:pPr lvl="2"/>
+            <a:r>
+              <a:rPr lang="en-US"/>
+              <a:t>Third level</a:t>
+            </a:r>
+          </a:p>
+          <a:p>
+            <a:pPr lvl="3"/>
+            <a:r>
+              <a:rPr lang="en-US"/>
+              <a:t>Fourth level</a:t>
+            </a:r>
+          </a:p>
+          <a:p>
+            <a:pPr lvl="4"/>
+            <a:r>
+              <a:rPr lang="en-US"/>
+              <a:t>Fifth level</a:t>
+            </a:r>
+          </a:p>
+        </p:txBody>
+      </p:sp>
+      <p:sp>
+        <p:nvSpPr>
+          <p:cNvPr id="6" name="Footer Placeholder 5"/>
+          <p:cNvSpPr>
+            <a:spLocks noGrp="1"/>
+          </p:cNvSpPr>
+          <p:nvPr>
+            <p:ph type="ftr" sz="quarter" idx="4"/>
+          </p:nvPr>
+        </p:nvSpPr>
+        <p:spPr>
+          <a:xfrm>
+            <a:off x="0" y="8685213"/>
+            <a:ext cx="2971800" cy="458787"/>
+          </a:xfrm>
+          <a:prstGeom prst="rect">
+            <a:avLst/>
+          </a:prstGeom>
+        </p:spPr>
+        <p:txBody>
+          <a:bodyPr vert="horz" lIns="91440" tIns="45720" rIns="91440" bIns="45720" rtlCol="0" anchor="b"/>
+          <a:lstStyle>
+            <a:lvl1pPr algn="l">
+              <a:defRPr sz="1200"/>
+            </a:lvl1pPr>
+          </a:lstStyle>
+          <a:p>
+            <a:endParaRPr lang="en-US"/>
+          </a:p>
+        </p:txBody>
+      </p:sp>
+      <p:sp>
+        <p:nvSpPr>
+          <p:cNvPr id="7" name="Slide Number Placeholder 6"/>
+          <p:cNvSpPr>
+            <a:spLocks noGrp="1"/>
+          </p:cNvSpPr>
+          <p:nvPr>
+            <p:ph type="sldNum" sz="quarter" idx="5"/>
+          </p:nvPr>
+        </p:nvSpPr>
+        <p:spPr>
+          <a:xfrm>
+            <a:off x="3884613" y="8685213"/>
+            <a:ext cx="2971800" cy="458787"/>
+          </a:xfrm>
+          <a:prstGeom prst="rect">
+            <a:avLst/>
+          </a:prstGeom>
+        </p:spPr>
+        <p:txBody>
+          <a:bodyPr vert="horz" lIns="91440" tIns="45720" rIns="91440" bIns="45720" rtlCol="0" anchor="b"/>
+          <a:lstStyle>
+            <a:lvl1pPr algn="r">
+              <a:defRPr sz="1200"/>
+            </a:lvl1pPr>
+          </a:lstStyle>
+          <a:p>
+            <a:fld id="{D230233D-A00F-40B4-AB85-BD301EED97B2}" type="slidenum">
+              <a:rPr lang="en-US" smtClean="0"/>
+              <a:t>‹#›</a:t>
+            </a:fld>
+            <a:endParaRPr lang="en-US"/>
+          </a:p>
+        </p:txBody>
+      </p:sp>
+    </p:spTree>
+    <p:extLst>
+      <p:ext uri="{BB962C8B-B14F-4D97-AF65-F5344CB8AC3E}">
+        <p14:creationId xmlns:p14="http://schemas.microsoft.com/office/powerpoint/2010/main" val="2178039126"/>
+      </p:ext>
+    </p:extLst>
+  </p:cSld>
+  <p:clrMap bg1="lt1" tx1="dk1" bg2="lt2" tx2="dk2" accent1="accent1" accent2="accent2" accent3="accent3" accent4="accent4" accent5="accent5" accent6="accent6" hlink="hlink" folHlink="folHlink"/>
+  <p:notesStyle>
+    <a:lvl1pPr marL="0" algn="l" defTabSz="914400" rtl="0" eaLnBrk="1" latinLnBrk="0" hangingPunct="1">
+      <a:defRPr sz="1200" kern="1200">
+        <a:solidFill>
+          <a:schemeClr val="tx1"/>
+        </a:solidFill>
+        <a:latin typeface="+mn-lt"/>
+        <a:ea typeface="+mn-ea"/>
+        <a:cs typeface="+mn-cs"/>
+      </a:defRPr>
+    </a:lvl1pPr>
+    <a:lvl2pPr marL="457200" algn="l" defTabSz="914400" rtl="0" eaLnBrk="1" latinLnBrk="0" hangingPunct="1">
+      <a:defRPr sz="1200" kern="1200">
+        <a:solidFill>
+          <a:schemeClr val="tx1"/>
+        </a:solidFill>
+        <a:latin typeface="+mn-lt"/>
+        <a:ea typeface="+mn-ea"/>
+        <a:cs typeface="+mn-cs"/>
+      </a:defRPr>
+    </a:lvl2pPr>
+    <a:lvl3pPr marL="914400" algn="l" defTabSz="914400" rtl="0" eaLnBrk="1" latinLnBrk="0" hangingPunct="1">
+      <a:defRPr sz="1200" kern="1200">
+        <a:solidFill>
+          <a:schemeClr val="tx1"/>
+        </a:solidFill>
+        <a:latin typeface="+mn-lt"/>
+        <a:ea typeface="+mn-ea"/>
+        <a:cs typeface="+mn-cs"/>
+      </a:defRPr>
+    </a:lvl3pPr>
+    <a:lvl4pPr marL="1371600" algn="l" defTabSz="914400" rtl="0" eaLnBrk="1" latinLnBrk="0" hangingPunct="1">
+      <a:defRPr sz="1200" kern="1200">
+        <a:solidFill>
+          <a:schemeClr val="tx1"/>
+        </a:solidFill>
+        <a:latin typeface="+mn-lt"/>
+        <a:ea typeface="+mn-ea"/>
+        <a:cs typeface="+mn-cs"/>
+      </a:defRPr>
+    </a:lvl4pPr>
+    <a:lvl5pPr marL="1828800" algn="l" defTabSz="914400" rtl="0" eaLnBrk="1" latinLnBrk="0" hangingPunct="1">
+      <a:defRPr sz="1200" kern="1200">
+        <a:solidFill>
+          <a:schemeClr val="tx1"/>
+        </a:solidFill>
+        <a:latin typeface="+mn-lt"/>
+        <a:ea typeface="+mn-ea"/>
+        <a:cs typeface="+mn-cs"/>
+      </a:defRPr>
+    </a:lvl5pPr>
+    <a:lvl6pPr marL="2286000" algn="l" defTabSz="914400" rtl="0" eaLnBrk="1" latinLnBrk="0" hangingPunct="1">
+      <a:defRPr sz="1200" kern="1200">
+        <a:solidFill>
+          <a:schemeClr val="tx1"/>
+        </a:solidFill>
+        <a:latin typeface="+mn-lt"/>
+        <a:ea typeface="+mn-ea"/>
+        <a:cs typeface="+mn-cs"/>
+      </a:defRPr>
+    </a:lvl6pPr>
+    <a:lvl7pPr marL="2743200" algn="l" defTabSz="914400" rtl="0" eaLnBrk="1" latinLnBrk="0" hangingPunct="1">
+      <a:defRPr sz="1200" kern="1200">
+        <a:solidFill>
+          <a:schemeClr val="tx1"/>
+        </a:solidFill>
+        <a:latin typeface="+mn-lt"/>
+        <a:ea typeface="+mn-ea"/>
+        <a:cs typeface="+mn-cs"/>
+      </a:defRPr>
+    </a:lvl7pPr>
+    <a:lvl8pPr marL="3200400" algn="l" defTabSz="914400" rtl="0" eaLnBrk="1" latinLnBrk="0" hangingPunct="1">
+      <a:defRPr sz="1200" kern="1200">
+        <a:solidFill>
+          <a:schemeClr val="tx1"/>
+        </a:solidFill>
+        <a:latin typeface="+mn-lt"/>
+        <a:ea typeface="+mn-ea"/>
+        <a:cs typeface="+mn-cs"/>
+      </a:defRPr>
+    </a:lvl8pPr>
+    <a:lvl9pPr marL="3657600" algn="l" defTabSz="914400" rtl="0" eaLnBrk="1" latinLnBrk="0" hangingPunct="1">
+      <a:defRPr sz="1200" kern="1200">
+        <a:solidFill>
+          <a:schemeClr val="tx1"/>
+        </a:solidFill>
+        <a:latin typeface="+mn-lt"/>
+        <a:ea typeface="+mn-ea"/>
+        <a:cs typeface="+mn-cs"/>
+      </a:defRPr>
+    </a:lvl9pPr>
+  </p:notesStyle>
+</p:notesMaster>
+</file>
+
+<file path=ppt/notesSlides/notesSlide1.xml><?xml version="1.0" encoding="utf-8"?>
+<p:notes xmlns:a="http://schemas.openxmlformats.org/drawingml/2006/main" xmlns:r="http://schemas.openxmlformats.org/officeDocument/2006/relationships" xmlns:p="http://schemas.openxmlformats.org/presentationml/2006/main">
+  <p:cSld>
+    <p:spTree>
+      <p:nvGrpSpPr>
+        <p:cNvPr id="1" name=""/>
+        <p:cNvGrpSpPr/>
+        <p:nvPr/>
+      </p:nvGrpSpPr>
+      <p:grpSpPr>
+        <a:xfrm>
+          <a:off x="0" y="0"/>
+          <a:ext cx="0" cy="0"/>
+          <a:chOff x="0" y="0"/>
+          <a:chExt cx="0" cy="0"/>
+        </a:xfrm>
+      </p:grpSpPr>
+      <p:sp>
+        <p:nvSpPr>
+          <p:cNvPr id="2" name="Slide Image Placeholder 1"/>
+          <p:cNvSpPr>
+            <a:spLocks noGrp="1" noRot="1" noChangeAspect="1"/>
+          </p:cNvSpPr>
+          <p:nvPr>
+            <p:ph type="sldImg"/>
+          </p:nvPr>
+        </p:nvSpPr>
+        <p:spPr/>
+      </p:sp>
+      <p:sp>
+        <p:nvSpPr>
+          <p:cNvPr id="3" name="Notes Placeholder 2"/>
+          <p:cNvSpPr>
+            <a:spLocks noGrp="1"/>
+          </p:cNvSpPr>
+          <p:nvPr>
+            <p:ph type="body" idx="1"/>
+          </p:nvPr>
+        </p:nvSpPr>
+        <p:spPr/>
+        <p:txBody>
+          <a:bodyPr/>
+          <a:lstStyle/>
+          <a:p>
+            <a:endParaRPr lang="en-US" dirty="0"/>
+          </a:p>
+        </p:txBody>
+      </p:sp>
+      <p:sp>
+        <p:nvSpPr>
+          <p:cNvPr id="4" name="Slide Number Placeholder 3"/>
+          <p:cNvSpPr>
+            <a:spLocks noGrp="1"/>
+          </p:cNvSpPr>
+          <p:nvPr>
+            <p:ph type="sldNum" sz="quarter" idx="5"/>
+          </p:nvPr>
+        </p:nvSpPr>
+        <p:spPr/>
+        <p:txBody>
+          <a:bodyPr/>
+          <a:lstStyle/>
+          <a:p>
+            <a:fld id="{D230233D-A00F-40B4-AB85-BD301EED97B2}" type="slidenum">
+              <a:rPr lang="en-US" smtClean="0"/>
+              <a:t>9</a:t>
+            </a:fld>
+            <a:endParaRPr lang="en-US"/>
+          </a:p>
+        </p:txBody>
+      </p:sp>
+    </p:spTree>
+    <p:extLst>
+      <p:ext uri="{BB962C8B-B14F-4D97-AF65-F5344CB8AC3E}">
+        <p14:creationId xmlns:p14="http://schemas.microsoft.com/office/powerpoint/2010/main" val="4057735032"/>
+      </p:ext>
+    </p:extLst>
+  </p:cSld>
+  <p:clrMapOvr>
+    <a:masterClrMapping/>
+  </p:clrMapOvr>
+</p:notes>
 </file>
 
 <file path=ppt/slideLayouts/slideLayout1.xml><?xml version="1.0" encoding="utf-8"?>
@@ -160,10 +605,9 @@
           <a:lstStyle/>
           <a:p>
             <a:r>
-              <a:rPr lang="en-US" smtClean="0"/>
+              <a:rPr lang="en-US"/>
               <a:t>Click to edit Master title style</a:t>
             </a:r>
-            <a:endParaRPr lang="en-US"/>
           </a:p>
         </p:txBody>
       </p:sp>
@@ -279,10 +723,9 @@
           </a:lstStyle>
           <a:p>
             <a:r>
-              <a:rPr lang="en-US" smtClean="0"/>
+              <a:rPr lang="en-US"/>
               <a:t>Click to edit Master subtitle style</a:t>
             </a:r>
-            <a:endParaRPr lang="en-US"/>
           </a:p>
         </p:txBody>
       </p:sp>
@@ -303,7 +746,7 @@
           <a:p>
             <a:fld id="{5BCAD085-E8A6-8845-BD4E-CB4CCA059FC4}" type="datetimeFigureOut">
               <a:rPr lang="en-US" smtClean="0"/>
-              <a:t>1/27/13</a:t>
+              <a:t>2/20/2026</a:t>
             </a:fld>
             <a:endParaRPr lang="en-US"/>
           </a:p>
@@ -397,10 +840,9 @@
           <a:lstStyle/>
           <a:p>
             <a:r>
-              <a:rPr lang="en-US" smtClean="0"/>
+              <a:rPr lang="en-US"/>
               <a:t>Click to edit Master title style</a:t>
             </a:r>
-            <a:endParaRPr lang="en-US"/>
           </a:p>
         </p:txBody>
       </p:sp>
@@ -421,38 +863,37 @@
           <a:p>
             <a:pPr lvl="0"/>
             <a:r>
-              <a:rPr lang="en-US" smtClean="0"/>
+              <a:rPr lang="en-US"/>
               <a:t>Click to edit Master text styles</a:t>
             </a:r>
           </a:p>
           <a:p>
             <a:pPr lvl="1"/>
             <a:r>
-              <a:rPr lang="en-US" smtClean="0"/>
+              <a:rPr lang="en-US"/>
               <a:t>Second level</a:t>
             </a:r>
           </a:p>
           <a:p>
             <a:pPr lvl="2"/>
             <a:r>
-              <a:rPr lang="en-US" smtClean="0"/>
+              <a:rPr lang="en-US"/>
               <a:t>Third level</a:t>
             </a:r>
           </a:p>
           <a:p>
             <a:pPr lvl="3"/>
             <a:r>
-              <a:rPr lang="en-US" smtClean="0"/>
+              <a:rPr lang="en-US"/>
               <a:t>Fourth level</a:t>
             </a:r>
           </a:p>
           <a:p>
             <a:pPr lvl="4"/>
             <a:r>
-              <a:rPr lang="en-US" smtClean="0"/>
+              <a:rPr lang="en-US"/>
               <a:t>Fifth level</a:t>
             </a:r>
-            <a:endParaRPr lang="en-US"/>
           </a:p>
         </p:txBody>
       </p:sp>
@@ -473,7 +914,7 @@
           <a:p>
             <a:fld id="{5BCAD085-E8A6-8845-BD4E-CB4CCA059FC4}" type="datetimeFigureOut">
               <a:rPr lang="en-US" smtClean="0"/>
-              <a:t>1/27/13</a:t>
+              <a:t>2/20/2026</a:t>
             </a:fld>
             <a:endParaRPr lang="en-US"/>
           </a:p>
@@ -572,10 +1013,9 @@
           <a:lstStyle/>
           <a:p>
             <a:r>
-              <a:rPr lang="en-US" smtClean="0"/>
+              <a:rPr lang="en-US"/>
               <a:t>Click to edit Master title style</a:t>
             </a:r>
-            <a:endParaRPr lang="en-US"/>
           </a:p>
         </p:txBody>
       </p:sp>
@@ -601,38 +1041,37 @@
           <a:p>
             <a:pPr lvl="0"/>
             <a:r>
-              <a:rPr lang="en-US" smtClean="0"/>
+              <a:rPr lang="en-US"/>
               <a:t>Click to edit Master text styles</a:t>
             </a:r>
           </a:p>
           <a:p>
             <a:pPr lvl="1"/>
             <a:r>
-              <a:rPr lang="en-US" smtClean="0"/>
+              <a:rPr lang="en-US"/>
               <a:t>Second level</a:t>
             </a:r>
           </a:p>
           <a:p>
             <a:pPr lvl="2"/>
             <a:r>
-              <a:rPr lang="en-US" smtClean="0"/>
+              <a:rPr lang="en-US"/>
               <a:t>Third level</a:t>
             </a:r>
           </a:p>
           <a:p>
             <a:pPr lvl="3"/>
             <a:r>
-              <a:rPr lang="en-US" smtClean="0"/>
+              <a:rPr lang="en-US"/>
               <a:t>Fourth level</a:t>
             </a:r>
           </a:p>
           <a:p>
             <a:pPr lvl="4"/>
             <a:r>
-              <a:rPr lang="en-US" smtClean="0"/>
+              <a:rPr lang="en-US"/>
               <a:t>Fifth level</a:t>
             </a:r>
-            <a:endParaRPr lang="en-US"/>
           </a:p>
         </p:txBody>
       </p:sp>
@@ -653,7 +1092,7 @@
           <a:p>
             <a:fld id="{5BCAD085-E8A6-8845-BD4E-CB4CCA059FC4}" type="datetimeFigureOut">
               <a:rPr lang="en-US" smtClean="0"/>
-              <a:t>1/27/13</a:t>
+              <a:t>2/20/2026</a:t>
             </a:fld>
             <a:endParaRPr lang="en-US"/>
           </a:p>
@@ -747,10 +1186,9 @@
           <a:lstStyle/>
           <a:p>
             <a:r>
-              <a:rPr lang="en-US" smtClean="0"/>
+              <a:rPr lang="en-US"/>
               <a:t>Click to edit Master title style</a:t>
             </a:r>
-            <a:endParaRPr lang="en-US"/>
           </a:p>
         </p:txBody>
       </p:sp>
@@ -771,38 +1209,37 @@
           <a:p>
             <a:pPr lvl="0"/>
             <a:r>
-              <a:rPr lang="en-US" smtClean="0"/>
+              <a:rPr lang="en-US"/>
               <a:t>Click to edit Master text styles</a:t>
             </a:r>
           </a:p>
           <a:p>
             <a:pPr lvl="1"/>
             <a:r>
-              <a:rPr lang="en-US" smtClean="0"/>
+              <a:rPr lang="en-US"/>
               <a:t>Second level</a:t>
             </a:r>
           </a:p>
           <a:p>
             <a:pPr lvl="2"/>
             <a:r>
-              <a:rPr lang="en-US" smtClean="0"/>
+              <a:rPr lang="en-US"/>
               <a:t>Third level</a:t>
             </a:r>
           </a:p>
           <a:p>
             <a:pPr lvl="3"/>
             <a:r>
-              <a:rPr lang="en-US" smtClean="0"/>
+              <a:rPr lang="en-US"/>
               <a:t>Fourth level</a:t>
             </a:r>
           </a:p>
           <a:p>
             <a:pPr lvl="4"/>
             <a:r>
-              <a:rPr lang="en-US" smtClean="0"/>
+              <a:rPr lang="en-US"/>
               <a:t>Fifth level</a:t>
             </a:r>
-            <a:endParaRPr lang="en-US"/>
           </a:p>
         </p:txBody>
       </p:sp>
@@ -823,7 +1260,7 @@
           <a:p>
             <a:fld id="{5BCAD085-E8A6-8845-BD4E-CB4CCA059FC4}" type="datetimeFigureOut">
               <a:rPr lang="en-US" smtClean="0"/>
-              <a:t>1/27/13</a:t>
+              <a:t>2/20/2026</a:t>
             </a:fld>
             <a:endParaRPr lang="en-US"/>
           </a:p>
@@ -926,10 +1363,9 @@
           </a:lstStyle>
           <a:p>
             <a:r>
-              <a:rPr lang="en-US" smtClean="0"/>
+              <a:rPr lang="en-US"/>
               <a:t>Click to edit Master title style</a:t>
             </a:r>
-            <a:endParaRPr lang="en-US"/>
           </a:p>
         </p:txBody>
       </p:sp>
@@ -1046,7 +1482,7 @@
           <a:p>
             <a:pPr lvl="0"/>
             <a:r>
-              <a:rPr lang="en-US" smtClean="0"/>
+              <a:rPr lang="en-US"/>
               <a:t>Click to edit Master text styles</a:t>
             </a:r>
           </a:p>
@@ -1069,7 +1505,7 @@
           <a:p>
             <a:fld id="{5BCAD085-E8A6-8845-BD4E-CB4CCA059FC4}" type="datetimeFigureOut">
               <a:rPr lang="en-US" smtClean="0"/>
-              <a:t>1/27/13</a:t>
+              <a:t>2/20/2026</a:t>
             </a:fld>
             <a:endParaRPr lang="en-US"/>
           </a:p>
@@ -1163,10 +1599,9 @@
           <a:lstStyle/>
           <a:p>
             <a:r>
-              <a:rPr lang="en-US" smtClean="0"/>
+              <a:rPr lang="en-US"/>
               <a:t>Click to edit Master title style</a:t>
             </a:r>
-            <a:endParaRPr lang="en-US"/>
           </a:p>
         </p:txBody>
       </p:sp>
@@ -1220,38 +1655,37 @@
           <a:p>
             <a:pPr lvl="0"/>
             <a:r>
-              <a:rPr lang="en-US" smtClean="0"/>
+              <a:rPr lang="en-US"/>
               <a:t>Click to edit Master text styles</a:t>
             </a:r>
           </a:p>
           <a:p>
             <a:pPr lvl="1"/>
             <a:r>
-              <a:rPr lang="en-US" smtClean="0"/>
+              <a:rPr lang="en-US"/>
               <a:t>Second level</a:t>
             </a:r>
           </a:p>
           <a:p>
             <a:pPr lvl="2"/>
             <a:r>
-              <a:rPr lang="en-US" smtClean="0"/>
+              <a:rPr lang="en-US"/>
               <a:t>Third level</a:t>
             </a:r>
           </a:p>
           <a:p>
             <a:pPr lvl="3"/>
             <a:r>
-              <a:rPr lang="en-US" smtClean="0"/>
+              <a:rPr lang="en-US"/>
               <a:t>Fourth level</a:t>
             </a:r>
           </a:p>
           <a:p>
             <a:pPr lvl="4"/>
             <a:r>
-              <a:rPr lang="en-US" smtClean="0"/>
+              <a:rPr lang="en-US"/>
               <a:t>Fifth level</a:t>
             </a:r>
-            <a:endParaRPr lang="en-US"/>
           </a:p>
         </p:txBody>
       </p:sp>
@@ -1305,38 +1739,37 @@
           <a:p>
             <a:pPr lvl="0"/>
             <a:r>
-              <a:rPr lang="en-US" smtClean="0"/>
+              <a:rPr lang="en-US"/>
               <a:t>Click to edit Master text styles</a:t>
             </a:r>
           </a:p>
           <a:p>
             <a:pPr lvl="1"/>
             <a:r>
-              <a:rPr lang="en-US" smtClean="0"/>
+              <a:rPr lang="en-US"/>
               <a:t>Second level</a:t>
             </a:r>
           </a:p>
           <a:p>
             <a:pPr lvl="2"/>
             <a:r>
-              <a:rPr lang="en-US" smtClean="0"/>
+              <a:rPr lang="en-US"/>
               <a:t>Third level</a:t>
             </a:r>
           </a:p>
           <a:p>
             <a:pPr lvl="3"/>
             <a:r>
-              <a:rPr lang="en-US" smtClean="0"/>
+              <a:rPr lang="en-US"/>
               <a:t>Fourth level</a:t>
             </a:r>
           </a:p>
           <a:p>
             <a:pPr lvl="4"/>
             <a:r>
-              <a:rPr lang="en-US" smtClean="0"/>
+              <a:rPr lang="en-US"/>
               <a:t>Fifth level</a:t>
             </a:r>
-            <a:endParaRPr lang="en-US"/>
           </a:p>
         </p:txBody>
       </p:sp>
@@ -1357,7 +1790,7 @@
           <a:p>
             <a:fld id="{5BCAD085-E8A6-8845-BD4E-CB4CCA059FC4}" type="datetimeFigureOut">
               <a:rPr lang="en-US" smtClean="0"/>
-              <a:t>1/27/13</a:t>
+              <a:t>2/20/2026</a:t>
             </a:fld>
             <a:endParaRPr lang="en-US"/>
           </a:p>
@@ -1455,10 +1888,9 @@
           </a:lstStyle>
           <a:p>
             <a:r>
-              <a:rPr lang="en-US" smtClean="0"/>
+              <a:rPr lang="en-US"/>
               <a:t>Click to edit Master title style</a:t>
             </a:r>
-            <a:endParaRPr lang="en-US"/>
           </a:p>
         </p:txBody>
       </p:sp>
@@ -1521,7 +1953,7 @@
           <a:p>
             <a:pPr lvl="0"/>
             <a:r>
-              <a:rPr lang="en-US" smtClean="0"/>
+              <a:rPr lang="en-US"/>
               <a:t>Click to edit Master text styles</a:t>
             </a:r>
           </a:p>
@@ -1577,38 +2009,37 @@
           <a:p>
             <a:pPr lvl="0"/>
             <a:r>
-              <a:rPr lang="en-US" smtClean="0"/>
+              <a:rPr lang="en-US"/>
               <a:t>Click to edit Master text styles</a:t>
             </a:r>
           </a:p>
           <a:p>
             <a:pPr lvl="1"/>
             <a:r>
-              <a:rPr lang="en-US" smtClean="0"/>
+              <a:rPr lang="en-US"/>
               <a:t>Second level</a:t>
             </a:r>
           </a:p>
           <a:p>
             <a:pPr lvl="2"/>
             <a:r>
-              <a:rPr lang="en-US" smtClean="0"/>
+              <a:rPr lang="en-US"/>
               <a:t>Third level</a:t>
             </a:r>
           </a:p>
           <a:p>
             <a:pPr lvl="3"/>
             <a:r>
-              <a:rPr lang="en-US" smtClean="0"/>
+              <a:rPr lang="en-US"/>
               <a:t>Fourth level</a:t>
             </a:r>
           </a:p>
           <a:p>
             <a:pPr lvl="4"/>
             <a:r>
-              <a:rPr lang="en-US" smtClean="0"/>
+              <a:rPr lang="en-US"/>
               <a:t>Fifth level</a:t>
             </a:r>
-            <a:endParaRPr lang="en-US"/>
           </a:p>
         </p:txBody>
       </p:sp>
@@ -1671,7 +2102,7 @@
           <a:p>
             <a:pPr lvl="0"/>
             <a:r>
-              <a:rPr lang="en-US" smtClean="0"/>
+              <a:rPr lang="en-US"/>
               <a:t>Click to edit Master text styles</a:t>
             </a:r>
           </a:p>
@@ -1727,38 +2158,37 @@
           <a:p>
             <a:pPr lvl="0"/>
             <a:r>
-              <a:rPr lang="en-US" smtClean="0"/>
+              <a:rPr lang="en-US"/>
               <a:t>Click to edit Master text styles</a:t>
             </a:r>
           </a:p>
           <a:p>
             <a:pPr lvl="1"/>
             <a:r>
-              <a:rPr lang="en-US" smtClean="0"/>
+              <a:rPr lang="en-US"/>
               <a:t>Second level</a:t>
             </a:r>
           </a:p>
           <a:p>
             <a:pPr lvl="2"/>
             <a:r>
-              <a:rPr lang="en-US" smtClean="0"/>
+              <a:rPr lang="en-US"/>
               <a:t>Third level</a:t>
             </a:r>
           </a:p>
           <a:p>
             <a:pPr lvl="3"/>
             <a:r>
-              <a:rPr lang="en-US" smtClean="0"/>
+              <a:rPr lang="en-US"/>
               <a:t>Fourth level</a:t>
             </a:r>
           </a:p>
           <a:p>
             <a:pPr lvl="4"/>
             <a:r>
-              <a:rPr lang="en-US" smtClean="0"/>
+              <a:rPr lang="en-US"/>
               <a:t>Fifth level</a:t>
             </a:r>
-            <a:endParaRPr lang="en-US"/>
           </a:p>
         </p:txBody>
       </p:sp>
@@ -1779,7 +2209,7 @@
           <a:p>
             <a:fld id="{5BCAD085-E8A6-8845-BD4E-CB4CCA059FC4}" type="datetimeFigureOut">
               <a:rPr lang="en-US" smtClean="0"/>
-              <a:t>1/27/13</a:t>
+              <a:t>2/20/2026</a:t>
             </a:fld>
             <a:endParaRPr lang="en-US"/>
           </a:p>
@@ -1873,10 +2303,9 @@
           <a:lstStyle/>
           <a:p>
             <a:r>
-              <a:rPr lang="en-US" smtClean="0"/>
+              <a:rPr lang="en-US"/>
               <a:t>Click to edit Master title style</a:t>
             </a:r>
-            <a:endParaRPr lang="en-US"/>
           </a:p>
         </p:txBody>
       </p:sp>
@@ -1897,7 +2326,7 @@
           <a:p>
             <a:fld id="{5BCAD085-E8A6-8845-BD4E-CB4CCA059FC4}" type="datetimeFigureOut">
               <a:rPr lang="en-US" smtClean="0"/>
-              <a:t>1/27/13</a:t>
+              <a:t>2/20/2026</a:t>
             </a:fld>
             <a:endParaRPr lang="en-US"/>
           </a:p>
@@ -1992,7 +2421,7 @@
           <a:p>
             <a:fld id="{5BCAD085-E8A6-8845-BD4E-CB4CCA059FC4}" type="datetimeFigureOut">
               <a:rPr lang="en-US" smtClean="0"/>
-              <a:t>1/27/13</a:t>
+              <a:t>2/20/2026</a:t>
             </a:fld>
             <a:endParaRPr lang="en-US"/>
           </a:p>
@@ -2095,10 +2524,9 @@
           </a:lstStyle>
           <a:p>
             <a:r>
-              <a:rPr lang="en-US" smtClean="0"/>
+              <a:rPr lang="en-US"/>
               <a:t>Click to edit Master title style</a:t>
             </a:r>
-            <a:endParaRPr lang="en-US"/>
           </a:p>
         </p:txBody>
       </p:sp>
@@ -2152,38 +2580,37 @@
           <a:p>
             <a:pPr lvl="0"/>
             <a:r>
-              <a:rPr lang="en-US" smtClean="0"/>
+              <a:rPr lang="en-US"/>
               <a:t>Click to edit Master text styles</a:t>
             </a:r>
           </a:p>
           <a:p>
             <a:pPr lvl="1"/>
             <a:r>
-              <a:rPr lang="en-US" smtClean="0"/>
+              <a:rPr lang="en-US"/>
               <a:t>Second level</a:t>
             </a:r>
           </a:p>
           <a:p>
             <a:pPr lvl="2"/>
             <a:r>
-              <a:rPr lang="en-US" smtClean="0"/>
+              <a:rPr lang="en-US"/>
               <a:t>Third level</a:t>
             </a:r>
           </a:p>
           <a:p>
             <a:pPr lvl="3"/>
             <a:r>
-              <a:rPr lang="en-US" smtClean="0"/>
+              <a:rPr lang="en-US"/>
               <a:t>Fourth level</a:t>
             </a:r>
           </a:p>
           <a:p>
             <a:pPr lvl="4"/>
             <a:r>
-              <a:rPr lang="en-US" smtClean="0"/>
+              <a:rPr lang="en-US"/>
               <a:t>Fifth level</a:t>
             </a:r>
-            <a:endParaRPr lang="en-US"/>
           </a:p>
         </p:txBody>
       </p:sp>
@@ -2246,7 +2673,7 @@
           <a:p>
             <a:pPr lvl="0"/>
             <a:r>
-              <a:rPr lang="en-US" smtClean="0"/>
+              <a:rPr lang="en-US"/>
               <a:t>Click to edit Master text styles</a:t>
             </a:r>
           </a:p>
@@ -2269,7 +2696,7 @@
           <a:p>
             <a:fld id="{5BCAD085-E8A6-8845-BD4E-CB4CCA059FC4}" type="datetimeFigureOut">
               <a:rPr lang="en-US" smtClean="0"/>
-              <a:t>1/27/13</a:t>
+              <a:t>2/20/2026</a:t>
             </a:fld>
             <a:endParaRPr lang="en-US"/>
           </a:p>
@@ -2372,10 +2799,9 @@
           </a:lstStyle>
           <a:p>
             <a:r>
-              <a:rPr lang="en-US" smtClean="0"/>
+              <a:rPr lang="en-US"/>
               <a:t>Click to edit Master title style</a:t>
             </a:r>
-            <a:endParaRPr lang="en-US"/>
           </a:p>
         </p:txBody>
       </p:sp>
@@ -2499,7 +2925,7 @@
           <a:p>
             <a:pPr lvl="0"/>
             <a:r>
-              <a:rPr lang="en-US" smtClean="0"/>
+              <a:rPr lang="en-US"/>
               <a:t>Click to edit Master text styles</a:t>
             </a:r>
           </a:p>
@@ -2522,7 +2948,7 @@
           <a:p>
             <a:fld id="{5BCAD085-E8A6-8845-BD4E-CB4CCA059FC4}" type="datetimeFigureOut">
               <a:rPr lang="en-US" smtClean="0"/>
-              <a:t>1/27/13</a:t>
+              <a:t>2/20/2026</a:t>
             </a:fld>
             <a:endParaRPr lang="en-US"/>
           </a:p>
@@ -2587,9 +3013,12 @@
 <p:sldMaster xmlns:a="http://schemas.openxmlformats.org/drawingml/2006/main" xmlns:r="http://schemas.openxmlformats.org/officeDocument/2006/relationships" xmlns:p="http://schemas.openxmlformats.org/presentationml/2006/main">
   <p:cSld>
     <p:bg>
-      <p:bgRef idx="1001">
-        <a:schemeClr val="bg1"/>
-      </p:bgRef>
+      <p:bgPr>
+        <a:solidFill>
+          <a:schemeClr val="bg1"/>
+        </a:solidFill>
+        <a:effectLst/>
+      </p:bgPr>
     </p:bg>
     <p:spTree>
       <p:nvGrpSpPr>
@@ -2631,10 +3060,9 @@
           <a:lstStyle/>
           <a:p>
             <a:r>
-              <a:rPr lang="en-US" smtClean="0"/>
+              <a:rPr lang="en-US"/>
               <a:t>Click to edit Master title style</a:t>
             </a:r>
-            <a:endParaRPr lang="en-US"/>
           </a:p>
         </p:txBody>
       </p:sp>
@@ -2665,38 +3093,37 @@
           <a:p>
             <a:pPr lvl="0"/>
             <a:r>
-              <a:rPr lang="en-US" smtClean="0"/>
+              <a:rPr lang="en-US"/>
               <a:t>Click to edit Master text styles</a:t>
             </a:r>
           </a:p>
           <a:p>
             <a:pPr lvl="1"/>
             <a:r>
-              <a:rPr lang="en-US" smtClean="0"/>
+              <a:rPr lang="en-US"/>
               <a:t>Second level</a:t>
             </a:r>
           </a:p>
           <a:p>
             <a:pPr lvl="2"/>
             <a:r>
-              <a:rPr lang="en-US" smtClean="0"/>
+              <a:rPr lang="en-US"/>
               <a:t>Third level</a:t>
             </a:r>
           </a:p>
           <a:p>
             <a:pPr lvl="3"/>
             <a:r>
-              <a:rPr lang="en-US" smtClean="0"/>
+              <a:rPr lang="en-US"/>
               <a:t>Fourth level</a:t>
             </a:r>
           </a:p>
           <a:p>
             <a:pPr lvl="4"/>
             <a:r>
-              <a:rPr lang="en-US" smtClean="0"/>
+              <a:rPr lang="en-US"/>
               <a:t>Fifth level</a:t>
             </a:r>
-            <a:endParaRPr lang="en-US"/>
           </a:p>
         </p:txBody>
       </p:sp>
@@ -2735,7 +3162,7 @@
           <a:p>
             <a:fld id="{5BCAD085-E8A6-8845-BD4E-CB4CCA059FC4}" type="datetimeFigureOut">
               <a:rPr lang="en-US" smtClean="0"/>
-              <a:t>1/27/13</a:t>
+              <a:t>2/20/2026</a:t>
             </a:fld>
             <a:endParaRPr lang="en-US"/>
           </a:p>
@@ -3094,23 +3521,22 @@
 </file>
 
 <file path=ppt/slides/slide1.xml><?xml version="1.0" encoding="utf-8"?>
-<p:sld xmlns:a="http://schemas.openxmlformats.org/drawingml/2006/main" xmlns:p="http://schemas.openxmlformats.org/presentationml/2006/main" xmlns:r="http://schemas.openxmlformats.org/officeDocument/2006/relationships">
+<p:sld xmlns:a="http://schemas.openxmlformats.org/drawingml/2006/main" xmlns:r="http://schemas.openxmlformats.org/officeDocument/2006/relationships" xmlns:p="http://schemas.openxmlformats.org/presentationml/2006/main">
   <p:cSld>
-    <p:bg>
-      <p:bgPr>
-        <a:solidFill>
-          <a:srgbClr val="F5EFE7"/>
-        </a:solidFill>
-        <a:effectLst/>
-      </p:bgPr>
-    </p:bg>
     <p:spTree>
       <p:nvGrpSpPr>
         <p:cNvPr id="1" name=""/>
         <p:cNvGrpSpPr/>
         <p:nvPr/>
       </p:nvGrpSpPr>
-      <p:grpSpPr/>
+      <p:grpSpPr>
+        <a:xfrm>
+          <a:off x="0" y="0"/>
+          <a:ext cx="0" cy="0"/>
+          <a:chOff x="0" y="0"/>
+          <a:chExt cx="0" cy="0"/>
+        </a:xfrm>
+      </p:grpSpPr>
       <p:sp>
         <p:nvSpPr>
           <p:cNvPr id="2" name="TextBox 1"/>
@@ -3191,24 +3617,177 @@
 </p:sld>
 </file>
 
-<file path=ppt/slides/slide10.xml><?xml version="1.0" encoding="utf-8"?>
-<p:sld xmlns:a="http://schemas.openxmlformats.org/drawingml/2006/main" xmlns:p="http://schemas.openxmlformats.org/presentationml/2006/main" xmlns:r="http://schemas.openxmlformats.org/officeDocument/2006/relationships">
+<file path=ppt/slides/slide2.xml><?xml version="1.0" encoding="utf-8"?>
+<p:sld xmlns:a="http://schemas.openxmlformats.org/drawingml/2006/main" xmlns:r="http://schemas.openxmlformats.org/officeDocument/2006/relationships" xmlns:p="http://schemas.openxmlformats.org/presentationml/2006/main">
   <p:cSld>
-    <p:bg>
-      <p:bgPr>
-        <a:solidFill>
-          <a:srgbClr val="F5EFE7"/>
-        </a:solidFill>
-        <a:effectLst/>
-      </p:bgPr>
-    </p:bg>
     <p:spTree>
       <p:nvGrpSpPr>
         <p:cNvPr id="1" name=""/>
         <p:cNvGrpSpPr/>
         <p:nvPr/>
       </p:nvGrpSpPr>
-      <p:grpSpPr/>
+      <p:grpSpPr>
+        <a:xfrm>
+          <a:off x="0" y="0"/>
+          <a:ext cx="0" cy="0"/>
+          <a:chOff x="0" y="0"/>
+          <a:chExt cx="0" cy="0"/>
+        </a:xfrm>
+      </p:grpSpPr>
+      <p:sp>
+        <p:nvSpPr>
+          <p:cNvPr id="2" name="TextBox 1"/>
+          <p:cNvSpPr txBox="1"/>
+          <p:nvPr/>
+        </p:nvSpPr>
+        <p:spPr>
+          <a:xfrm>
+            <a:off x="457200" y="457200"/>
+            <a:ext cx="10972800" cy="461665"/>
+          </a:xfrm>
+          <a:prstGeom prst="rect">
+            <a:avLst/>
+          </a:prstGeom>
+          <a:noFill/>
+        </p:spPr>
+        <p:txBody>
+          <a:bodyPr wrap="square">
+            <a:spAutoFit/>
+          </a:bodyPr>
+          <a:lstStyle/>
+          <a:p>
+            <a:pPr>
+              <a:defRPr sz="2400" b="1">
+                <a:solidFill>
+                  <a:srgbClr val="0072C6"/>
+                </a:solidFill>
+                <a:latin typeface="Segoe UI"/>
+              </a:defRPr>
+            </a:pPr>
+            <a:r>
+              <a:rPr lang="en-US" dirty="0"/>
+              <a:t>Executive summary</a:t>
+            </a:r>
+            <a:endParaRPr dirty="0"/>
+          </a:p>
+        </p:txBody>
+      </p:sp>
+      <p:sp>
+        <p:nvSpPr>
+          <p:cNvPr id="3" name="TextBox 2"/>
+          <p:cNvSpPr txBox="1"/>
+          <p:nvPr/>
+        </p:nvSpPr>
+        <p:spPr>
+          <a:xfrm>
+            <a:off x="457200" y="1371600"/>
+            <a:ext cx="10972800" cy="1338828"/>
+          </a:xfrm>
+          <a:prstGeom prst="rect">
+            <a:avLst/>
+          </a:prstGeom>
+          <a:noFill/>
+        </p:spPr>
+        <p:txBody>
+          <a:bodyPr wrap="square">
+            <a:spAutoFit/>
+          </a:bodyPr>
+          <a:lstStyle/>
+          <a:p>
+            <a:pPr>
+              <a:spcAft>
+                <a:spcPts val="1000"/>
+              </a:spcAft>
+              <a:defRPr sz="1400">
+                <a:solidFill>
+                  <a:srgbClr val="002060"/>
+                </a:solidFill>
+                <a:latin typeface="Segoe UI"/>
+              </a:defRPr>
+            </a:pPr>
+            <a:r>
+              <a:rPr lang="en-US" dirty="0"/>
+              <a:t>Wide platform reach but weak agent engagement</a:t>
+            </a:r>
+          </a:p>
+          <a:p>
+            <a:pPr>
+              <a:spcAft>
+                <a:spcPts val="1000"/>
+              </a:spcAft>
+              <a:defRPr sz="1400">
+                <a:solidFill>
+                  <a:srgbClr val="002060"/>
+                </a:solidFill>
+                <a:latin typeface="Segoe UI"/>
+              </a:defRPr>
+            </a:pPr>
+            <a:r>
+              <a:rPr dirty="0"/>
+              <a:t>Agent adoption stalled at 4% penetration despite 4,400+ Copilot users - untapped productivity potential</a:t>
+            </a:r>
+          </a:p>
+          <a:p>
+            <a:pPr>
+              <a:spcAft>
+                <a:spcPts val="1000"/>
+              </a:spcAft>
+              <a:defRPr sz="1400">
+                <a:solidFill>
+                  <a:srgbClr val="002060"/>
+                </a:solidFill>
+                <a:latin typeface="Segoe UI"/>
+              </a:defRPr>
+            </a:pPr>
+            <a:r>
+              <a:rPr dirty="0"/>
+              <a:t>87% of Agent users stuck in infrequent usage pattern (1-5 days/month) - habit formation crisis</a:t>
+            </a:r>
+          </a:p>
+          <a:p>
+            <a:pPr>
+              <a:spcAft>
+                <a:spcPts val="1000"/>
+              </a:spcAft>
+              <a:defRPr sz="1400">
+                <a:solidFill>
+                  <a:srgbClr val="002060"/>
+                </a:solidFill>
+                <a:latin typeface="Segoe UI"/>
+              </a:defRPr>
+            </a:pPr>
+            <a:r>
+              <a:rPr dirty="0"/>
+              <a:t>Finance, IT, and Legal show highest unlicensed engagement - immediate license upgrade candidates</a:t>
+            </a:r>
+          </a:p>
+        </p:txBody>
+      </p:sp>
+    </p:spTree>
+  </p:cSld>
+  <p:clrMapOvr>
+    <a:masterClrMapping/>
+  </p:clrMapOvr>
+</p:sld>
+</file>
+
+<file path=ppt/slides/slide3.xml><?xml version="1.0" encoding="utf-8"?>
+<p:sld xmlns:a="http://schemas.openxmlformats.org/drawingml/2006/main" xmlns:r="http://schemas.openxmlformats.org/officeDocument/2006/relationships" xmlns:p="http://schemas.openxmlformats.org/presentationml/2006/main">
+  <p:cSld>
+    <p:spTree>
+      <p:nvGrpSpPr>
+        <p:cNvPr id="1" name=""/>
+        <p:cNvGrpSpPr/>
+        <p:nvPr/>
+      </p:nvGrpSpPr>
+      <p:grpSpPr>
+        <a:xfrm>
+          <a:off x="0" y="0"/>
+          <a:ext cx="0" cy="0"/>
+          <a:chOff x="0" y="0"/>
+          <a:chExt cx="0" cy="0"/>
+        </a:xfrm>
+      </p:grpSpPr>
       <p:sp>
         <p:nvSpPr>
           <p:cNvPr id="2" name="TextBox 1"/>
@@ -3240,7 +3819,941 @@
               </a:defRPr>
             </a:pPr>
             <a:r>
-              <a:t>203K unlicensed actions demonstrate platform value but foregone premium feature adoption</a:t>
+              <a:t>Strong Copilot adoption masks critical Agent engagement gap requiring intervention</a:t>
+            </a:r>
+          </a:p>
+        </p:txBody>
+      </p:sp>
+      <p:pic>
+        <p:nvPicPr>
+          <p:cNvPr id="3" name="Picture 2" descr="temp_copilot_trends.png"/>
+          <p:cNvPicPr>
+            <a:picLocks noChangeAspect="1"/>
+          </p:cNvPicPr>
+          <p:nvPr/>
+        </p:nvPicPr>
+        <p:blipFill>
+          <a:blip r:embed="rId2"/>
+          <a:stretch>
+            <a:fillRect/>
+          </a:stretch>
+        </p:blipFill>
+        <p:spPr>
+          <a:xfrm>
+            <a:off x="457200" y="1371600"/>
+            <a:ext cx="6858000" cy="3911203"/>
+          </a:xfrm>
+          <a:prstGeom prst="rect">
+            <a:avLst/>
+          </a:prstGeom>
+          <a:ln w="25400">
+            <a:solidFill>
+              <a:srgbClr val="0072C6"/>
+            </a:solidFill>
+          </a:ln>
+        </p:spPr>
+      </p:pic>
+      <p:sp>
+        <p:nvSpPr>
+          <p:cNvPr id="4" name="TextBox 3"/>
+          <p:cNvSpPr txBox="1"/>
+          <p:nvPr/>
+        </p:nvSpPr>
+        <p:spPr>
+          <a:xfrm>
+            <a:off x="7589520" y="1371600"/>
+            <a:ext cx="4142232" cy="2677656"/>
+          </a:xfrm>
+          <a:prstGeom prst="rect">
+            <a:avLst/>
+          </a:prstGeom>
+          <a:noFill/>
+        </p:spPr>
+        <p:txBody>
+          <a:bodyPr wrap="square" anchor="t">
+            <a:spAutoFit/>
+          </a:bodyPr>
+          <a:lstStyle/>
+          <a:p>
+            <a:r>
+              <a:rPr lang="en-US" sz="1400" b="1" dirty="0">
+                <a:latin typeface="Segoe UI" panose="020B0502040204020203" pitchFamily="34" charset="0"/>
+                <a:cs typeface="Segoe UI" panose="020B0502040204020203" pitchFamily="34" charset="0"/>
+              </a:rPr>
+              <a:t>Broad platform reach established</a:t>
+            </a:r>
+          </a:p>
+          <a:p>
+            <a:r>
+              <a:rPr lang="en-US" sz="1400" dirty="0">
+                <a:latin typeface="Segoe UI" panose="020B0502040204020203" pitchFamily="34" charset="0"/>
+                <a:cs typeface="Segoe UI" panose="020B0502040204020203" pitchFamily="34" charset="0"/>
+              </a:rPr>
+              <a:t>4,381 active Copilot users across segments (2,585 unlicensed, 1,616 M365, 180 agents)</a:t>
+            </a:r>
+          </a:p>
+          <a:p>
+            <a:endParaRPr lang="en-US" sz="1400" dirty="0">
+              <a:latin typeface="Segoe UI" panose="020B0502040204020203" pitchFamily="34" charset="0"/>
+              <a:cs typeface="Segoe UI" panose="020B0502040204020203" pitchFamily="34" charset="0"/>
+            </a:endParaRPr>
+          </a:p>
+          <a:p>
+            <a:r>
+              <a:rPr lang="en-US" sz="1400" b="1" dirty="0">
+                <a:latin typeface="Segoe UI" panose="020B0502040204020203" pitchFamily="34" charset="0"/>
+                <a:cs typeface="Segoe UI" panose="020B0502040204020203" pitchFamily="34" charset="0"/>
+              </a:rPr>
+              <a:t>Agents driving accelerated adoption</a:t>
+            </a:r>
+            <a:br>
+              <a:rPr lang="en-US" sz="1400" dirty="0">
+                <a:latin typeface="Segoe UI" panose="020B0502040204020203" pitchFamily="34" charset="0"/>
+                <a:cs typeface="Segoe UI" panose="020B0502040204020203" pitchFamily="34" charset="0"/>
+              </a:rPr>
+            </a:br>
+            <a:r>
+              <a:rPr lang="en-US" sz="1400" dirty="0">
+                <a:latin typeface="Segoe UI" panose="020B0502040204020203" pitchFamily="34" charset="0"/>
+                <a:cs typeface="Segoe UI" panose="020B0502040204020203" pitchFamily="34" charset="0"/>
+              </a:rPr>
+              <a:t>3× growth in agent usage from March–June (7 → 21 actions per month), validating capability value</a:t>
+            </a:r>
+          </a:p>
+          <a:p>
+            <a:endParaRPr lang="en-US" sz="1400" dirty="0">
+              <a:latin typeface="Segoe UI" panose="020B0502040204020203" pitchFamily="34" charset="0"/>
+              <a:cs typeface="Segoe UI" panose="020B0502040204020203" pitchFamily="34" charset="0"/>
+            </a:endParaRPr>
+          </a:p>
+          <a:p>
+            <a:r>
+              <a:rPr lang="en-US" sz="1400" b="1" dirty="0">
+                <a:latin typeface="Segoe UI" panose="020B0502040204020203" pitchFamily="34" charset="0"/>
+                <a:cs typeface="Segoe UI" panose="020B0502040204020203" pitchFamily="34" charset="0"/>
+              </a:rPr>
+              <a:t>Legal Ops proves power-user model</a:t>
+            </a:r>
+            <a:br>
+              <a:rPr lang="en-US" sz="1400" dirty="0">
+                <a:latin typeface="Segoe UI" panose="020B0502040204020203" pitchFamily="34" charset="0"/>
+                <a:cs typeface="Segoe UI" panose="020B0502040204020203" pitchFamily="34" charset="0"/>
+              </a:rPr>
+            </a:br>
+            <a:r>
+              <a:rPr lang="en-US" sz="1400" dirty="0">
+                <a:latin typeface="Segoe UI" panose="020B0502040204020203" pitchFamily="34" charset="0"/>
+                <a:cs typeface="Segoe UI" panose="020B0502040204020203" pitchFamily="34" charset="0"/>
+              </a:rPr>
+              <a:t>Legal Operations emerging as a power segment (35 actions/user, 6+ active days), creating a clear replication opportunity</a:t>
+            </a:r>
+          </a:p>
+        </p:txBody>
+      </p:sp>
+    </p:spTree>
+  </p:cSld>
+  <p:clrMapOvr>
+    <a:masterClrMapping/>
+  </p:clrMapOvr>
+</p:sld>
+</file>
+
+<file path=ppt/slides/slide4.xml><?xml version="1.0" encoding="utf-8"?>
+<p:sld xmlns:a="http://schemas.openxmlformats.org/drawingml/2006/main" xmlns:r="http://schemas.openxmlformats.org/officeDocument/2006/relationships" xmlns:p="http://schemas.openxmlformats.org/presentationml/2006/main">
+  <p:cSld>
+    <p:spTree>
+      <p:nvGrpSpPr>
+        <p:cNvPr id="1" name=""/>
+        <p:cNvGrpSpPr/>
+        <p:nvPr/>
+      </p:nvGrpSpPr>
+      <p:grpSpPr>
+        <a:xfrm>
+          <a:off x="0" y="0"/>
+          <a:ext cx="0" cy="0"/>
+          <a:chOff x="0" y="0"/>
+          <a:chExt cx="0" cy="0"/>
+        </a:xfrm>
+      </p:grpSpPr>
+      <p:sp>
+        <p:nvSpPr>
+          <p:cNvPr id="2" name="TextBox 1"/>
+          <p:cNvSpPr txBox="1"/>
+          <p:nvPr/>
+        </p:nvSpPr>
+        <p:spPr>
+          <a:xfrm>
+            <a:off x="457200" y="457200"/>
+            <a:ext cx="10972800" cy="640080"/>
+          </a:xfrm>
+          <a:prstGeom prst="rect">
+            <a:avLst/>
+          </a:prstGeom>
+          <a:noFill/>
+        </p:spPr>
+        <p:txBody>
+          <a:bodyPr wrap="square">
+            <a:spAutoFit/>
+          </a:bodyPr>
+          <a:lstStyle/>
+          <a:p>
+            <a:pPr>
+              <a:defRPr sz="2400" b="1">
+                <a:solidFill>
+                  <a:srgbClr val="0072C6"/>
+                </a:solidFill>
+                <a:latin typeface="Segoe UI"/>
+              </a:defRPr>
+            </a:pPr>
+            <a:r>
+              <a:t>96% of Copilot users have never tried Agents - massive awareness and adoption gap</a:t>
+            </a:r>
+          </a:p>
+        </p:txBody>
+      </p:sp>
+      <p:pic>
+        <p:nvPicPr>
+          <p:cNvPr id="3" name="Picture 2" descr="temp_copilot_leaderboard.png"/>
+          <p:cNvPicPr>
+            <a:picLocks noChangeAspect="1"/>
+          </p:cNvPicPr>
+          <p:nvPr/>
+        </p:nvPicPr>
+        <p:blipFill>
+          <a:blip r:embed="rId2"/>
+          <a:stretch>
+            <a:fillRect/>
+          </a:stretch>
+        </p:blipFill>
+        <p:spPr>
+          <a:xfrm>
+            <a:off x="457200" y="1371600"/>
+            <a:ext cx="6858000" cy="3911203"/>
+          </a:xfrm>
+          <a:prstGeom prst="rect">
+            <a:avLst/>
+          </a:prstGeom>
+          <a:ln w="25400">
+            <a:solidFill>
+              <a:srgbClr val="0072C6"/>
+            </a:solidFill>
+          </a:ln>
+        </p:spPr>
+      </p:pic>
+      <p:sp>
+        <p:nvSpPr>
+          <p:cNvPr id="4" name="TextBox 3"/>
+          <p:cNvSpPr txBox="1"/>
+          <p:nvPr/>
+        </p:nvSpPr>
+        <p:spPr>
+          <a:xfrm>
+            <a:off x="7589520" y="1371600"/>
+            <a:ext cx="4142232" cy="2769989"/>
+          </a:xfrm>
+          <a:prstGeom prst="rect">
+            <a:avLst/>
+          </a:prstGeom>
+          <a:noFill/>
+        </p:spPr>
+        <p:txBody>
+          <a:bodyPr wrap="square" anchor="t">
+            <a:spAutoFit/>
+          </a:bodyPr>
+          <a:lstStyle/>
+          <a:p>
+            <a:pPr>
+              <a:spcAft>
+                <a:spcPts val="1200"/>
+              </a:spcAft>
+              <a:defRPr sz="1400">
+                <a:solidFill>
+                  <a:srgbClr val="002060"/>
+                </a:solidFill>
+                <a:latin typeface="Segoe UI"/>
+              </a:defRPr>
+            </a:pPr>
+            <a:r>
+              <a:rPr lang="en-US" b="1"/>
+              <a:t>Agents awareness gap is severe today</a:t>
+            </a:r>
+            <a:br>
+              <a:rPr lang="en-US"/>
+            </a:br>
+            <a:r>
+              <a:rPr dirty="0"/>
+              <a:t>Only 4% of 4,200+ Copilot users have adopted Agents across licensed and unlicensed segments</a:t>
+            </a:r>
+          </a:p>
+          <a:p>
+            <a:pPr>
+              <a:spcAft>
+                <a:spcPts val="1200"/>
+              </a:spcAft>
+              <a:defRPr sz="1400">
+                <a:solidFill>
+                  <a:srgbClr val="002060"/>
+                </a:solidFill>
+                <a:latin typeface="Segoe UI"/>
+              </a:defRPr>
+            </a:pPr>
+            <a:r>
+              <a:rPr lang="en-US" sz="1400" b="1">
+                <a:solidFill>
+                  <a:srgbClr val="002060"/>
+                </a:solidFill>
+                <a:latin typeface="Segoe UI" panose="020B0502040204020203" pitchFamily="34" charset="0"/>
+              </a:rPr>
+              <a:t>Finance</a:t>
+            </a:r>
+            <a:r>
+              <a:rPr lang="en-US" b="1"/>
+              <a:t> is the proof-point segment for enablement</a:t>
+            </a:r>
+            <a:br>
+              <a:rPr lang="en-US"/>
+            </a:br>
+            <a:r>
+              <a:rPr lang="en-US"/>
+              <a:t>Finance </a:t>
+            </a:r>
+            <a:r>
+              <a:rPr dirty="0"/>
+              <a:t>shows 7% agent adoption (highest) </a:t>
+            </a:r>
+            <a:r>
+              <a:rPr lang="en-US"/>
+              <a:t>with </a:t>
+            </a:r>
+            <a:r>
+              <a:rPr dirty="0"/>
+              <a:t>109 prompts/user</a:t>
+            </a:r>
+            <a:r>
+              <a:rPr lang="en-US"/>
+              <a:t>, validating</a:t>
+            </a:r>
+            <a:r>
+              <a:rPr dirty="0"/>
+              <a:t> targeted enablement</a:t>
+            </a:r>
+          </a:p>
+          <a:p>
+            <a:pPr>
+              <a:spcAft>
+                <a:spcPts val="1200"/>
+              </a:spcAft>
+              <a:defRPr sz="1400">
+                <a:solidFill>
+                  <a:srgbClr val="002060"/>
+                </a:solidFill>
+                <a:latin typeface="Segoe UI"/>
+              </a:defRPr>
+            </a:pPr>
+            <a:r>
+              <a:rPr lang="en-US" sz="1400" b="1">
+                <a:solidFill>
+                  <a:srgbClr val="002060"/>
+                </a:solidFill>
+                <a:latin typeface="Segoe UI" panose="020B0502040204020203" pitchFamily="34" charset="0"/>
+              </a:rPr>
+              <a:t>4,000+ users are not activating Agents</a:t>
+            </a:r>
+            <a:br>
+              <a:rPr lang="en-US"/>
+            </a:br>
+            <a:r>
+              <a:rPr dirty="0"/>
+              <a:t>Gap represents 4,000+ users unaware of or unmotivated to try agentic capabilities</a:t>
+            </a:r>
+            <a:r>
+              <a:rPr lang="en-US"/>
+              <a:t>—</a:t>
+            </a:r>
+            <a:r>
+              <a:rPr dirty="0"/>
+              <a:t>immediate action required</a:t>
+            </a:r>
+          </a:p>
+        </p:txBody>
+      </p:sp>
+    </p:spTree>
+  </p:cSld>
+  <p:clrMapOvr>
+    <a:masterClrMapping/>
+  </p:clrMapOvr>
+</p:sld>
+</file>
+
+<file path=ppt/slides/slide5.xml><?xml version="1.0" encoding="utf-8"?>
+<p:sld xmlns:a="http://schemas.openxmlformats.org/drawingml/2006/main" xmlns:r="http://schemas.openxmlformats.org/officeDocument/2006/relationships" xmlns:p="http://schemas.openxmlformats.org/presentationml/2006/main">
+  <p:cSld>
+    <p:spTree>
+      <p:nvGrpSpPr>
+        <p:cNvPr id="1" name=""/>
+        <p:cNvGrpSpPr/>
+        <p:nvPr/>
+      </p:nvGrpSpPr>
+      <p:grpSpPr>
+        <a:xfrm>
+          <a:off x="0" y="0"/>
+          <a:ext cx="0" cy="0"/>
+          <a:chOff x="0" y="0"/>
+          <a:chExt cx="0" cy="0"/>
+        </a:xfrm>
+      </p:grpSpPr>
+      <p:sp>
+        <p:nvSpPr>
+          <p:cNvPr id="2" name="TextBox 1"/>
+          <p:cNvSpPr txBox="1"/>
+          <p:nvPr/>
+        </p:nvSpPr>
+        <p:spPr>
+          <a:xfrm>
+            <a:off x="457200" y="457200"/>
+            <a:ext cx="10972800" cy="461665"/>
+          </a:xfrm>
+          <a:prstGeom prst="rect">
+            <a:avLst/>
+          </a:prstGeom>
+          <a:noFill/>
+        </p:spPr>
+        <p:txBody>
+          <a:bodyPr wrap="square">
+            <a:spAutoFit/>
+          </a:bodyPr>
+          <a:lstStyle/>
+          <a:p>
+            <a:pPr>
+              <a:defRPr sz="2400" b="1">
+                <a:solidFill>
+                  <a:srgbClr val="0072C6"/>
+                </a:solidFill>
+                <a:latin typeface="Segoe UI"/>
+              </a:defRPr>
+            </a:pPr>
+            <a:r>
+              <a:rPr lang="en-US" dirty="0"/>
+              <a:t>Agent usage is infrequent</a:t>
+            </a:r>
+            <a:r>
+              <a:rPr dirty="0"/>
+              <a:t>- usage has not embedded into workflows</a:t>
+            </a:r>
+          </a:p>
+        </p:txBody>
+      </p:sp>
+      <p:pic>
+        <p:nvPicPr>
+          <p:cNvPr id="3" name="Picture 2" descr="temp_agents_habits.png"/>
+          <p:cNvPicPr>
+            <a:picLocks noChangeAspect="1"/>
+          </p:cNvPicPr>
+          <p:nvPr/>
+        </p:nvPicPr>
+        <p:blipFill>
+          <a:blip r:embed="rId2"/>
+          <a:stretch>
+            <a:fillRect/>
+          </a:stretch>
+        </p:blipFill>
+        <p:spPr>
+          <a:xfrm>
+            <a:off x="457200" y="1371600"/>
+            <a:ext cx="6858000" cy="3911203"/>
+          </a:xfrm>
+          <a:prstGeom prst="rect">
+            <a:avLst/>
+          </a:prstGeom>
+          <a:ln w="25400">
+            <a:solidFill>
+              <a:srgbClr val="0072C6"/>
+            </a:solidFill>
+          </a:ln>
+        </p:spPr>
+      </p:pic>
+      <p:sp>
+        <p:nvSpPr>
+          <p:cNvPr id="4" name="TextBox 3"/>
+          <p:cNvSpPr txBox="1"/>
+          <p:nvPr/>
+        </p:nvSpPr>
+        <p:spPr>
+          <a:xfrm>
+            <a:off x="7589520" y="1371600"/>
+            <a:ext cx="4142232" cy="2708434"/>
+          </a:xfrm>
+          <a:prstGeom prst="rect">
+            <a:avLst/>
+          </a:prstGeom>
+          <a:noFill/>
+        </p:spPr>
+        <p:txBody>
+          <a:bodyPr wrap="square" anchor="t">
+            <a:spAutoFit/>
+          </a:bodyPr>
+          <a:lstStyle/>
+          <a:p>
+            <a:pPr>
+              <a:spcAft>
+                <a:spcPts val="1200"/>
+              </a:spcAft>
+              <a:defRPr sz="1400">
+                <a:solidFill>
+                  <a:srgbClr val="002060"/>
+                </a:solidFill>
+                <a:latin typeface="Segoe UI"/>
+              </a:defRPr>
+            </a:pPr>
+            <a:r>
+              <a:rPr lang="en-US" b="1" dirty="0"/>
+              <a:t>No daily users; only 3% frequent</a:t>
+            </a:r>
+            <a:br>
+              <a:rPr lang="en-US" dirty="0"/>
+            </a:br>
+            <a:r>
+              <a:rPr dirty="0"/>
+              <a:t>Zero daily users (20+ days/month</a:t>
+            </a:r>
+            <a:r>
+              <a:rPr lang="en-US" dirty="0"/>
+              <a:t>); </a:t>
+            </a:r>
+            <a:r>
+              <a:rPr dirty="0"/>
+              <a:t>only 3% frequent users</a:t>
+            </a:r>
+            <a:endParaRPr lang="en-US" dirty="0"/>
+          </a:p>
+          <a:p>
+            <a:pPr>
+              <a:spcAft>
+                <a:spcPts val="1200"/>
+              </a:spcAft>
+              <a:defRPr sz="1400">
+                <a:solidFill>
+                  <a:srgbClr val="002060"/>
+                </a:solidFill>
+                <a:latin typeface="Segoe UI"/>
+              </a:defRPr>
+            </a:pPr>
+            <a:r>
+              <a:rPr lang="en-US" dirty="0"/>
+              <a:t>Users try once but do not integrate into daily workflows</a:t>
+            </a:r>
+            <a:endParaRPr dirty="0"/>
+          </a:p>
+          <a:p>
+            <a:pPr>
+              <a:spcAft>
+                <a:spcPts val="1200"/>
+              </a:spcAft>
+              <a:defRPr sz="1400">
+                <a:solidFill>
+                  <a:srgbClr val="002060"/>
+                </a:solidFill>
+                <a:latin typeface="Segoe UI"/>
+              </a:defRPr>
+            </a:pPr>
+            <a:r>
+              <a:rPr lang="en-US" sz="1400" b="1" dirty="0">
+                <a:solidFill>
+                  <a:srgbClr val="002060"/>
+                </a:solidFill>
+                <a:latin typeface="Segoe UI" panose="020B0502040204020203" pitchFamily="34" charset="0"/>
+              </a:rPr>
+              <a:t>Finance</a:t>
+            </a:r>
+            <a:r>
+              <a:rPr lang="en-US" b="1" dirty="0"/>
+              <a:t> and Legal lead at 16 actions/user</a:t>
+            </a:r>
+            <a:br>
+              <a:rPr lang="en-US" dirty="0"/>
+            </a:br>
+            <a:r>
+              <a:rPr lang="en-US" dirty="0"/>
+              <a:t>Finance and Legal </a:t>
+            </a:r>
+            <a:r>
+              <a:rPr dirty="0"/>
+              <a:t>show highest engagement (16 actions/user</a:t>
+            </a:r>
+            <a:r>
+              <a:rPr lang="en-US" dirty="0"/>
+              <a:t>); usage is </a:t>
+            </a:r>
+            <a:r>
+              <a:rPr dirty="0"/>
+              <a:t>still infrequent</a:t>
+            </a:r>
+          </a:p>
+          <a:p>
+            <a:pPr>
+              <a:spcAft>
+                <a:spcPts val="1200"/>
+              </a:spcAft>
+              <a:defRPr sz="1400">
+                <a:solidFill>
+                  <a:srgbClr val="002060"/>
+                </a:solidFill>
+                <a:latin typeface="Segoe UI"/>
+              </a:defRPr>
+            </a:pPr>
+            <a:br>
+              <a:rPr lang="en-US" dirty="0"/>
+            </a:br>
+            <a:endParaRPr dirty="0"/>
+          </a:p>
+        </p:txBody>
+      </p:sp>
+    </p:spTree>
+  </p:cSld>
+  <p:clrMapOvr>
+    <a:masterClrMapping/>
+  </p:clrMapOvr>
+</p:sld>
+</file>
+
+<file path=ppt/slides/slide6.xml><?xml version="1.0" encoding="utf-8"?>
+<p:sld xmlns:a="http://schemas.openxmlformats.org/drawingml/2006/main" xmlns:r="http://schemas.openxmlformats.org/officeDocument/2006/relationships" xmlns:p="http://schemas.openxmlformats.org/presentationml/2006/main">
+  <p:cSld>
+    <p:spTree>
+      <p:nvGrpSpPr>
+        <p:cNvPr id="1" name=""/>
+        <p:cNvGrpSpPr/>
+        <p:nvPr/>
+      </p:nvGrpSpPr>
+      <p:grpSpPr>
+        <a:xfrm>
+          <a:off x="0" y="0"/>
+          <a:ext cx="0" cy="0"/>
+          <a:chOff x="0" y="0"/>
+          <a:chExt cx="0" cy="0"/>
+        </a:xfrm>
+      </p:grpSpPr>
+      <p:sp>
+        <p:nvSpPr>
+          <p:cNvPr id="2" name="TextBox 1"/>
+          <p:cNvSpPr txBox="1"/>
+          <p:nvPr/>
+        </p:nvSpPr>
+        <p:spPr>
+          <a:xfrm>
+            <a:off x="457200" y="457200"/>
+            <a:ext cx="10972800" cy="830997"/>
+          </a:xfrm>
+          <a:prstGeom prst="rect">
+            <a:avLst/>
+          </a:prstGeom>
+          <a:noFill/>
+        </p:spPr>
+        <p:txBody>
+          <a:bodyPr wrap="square">
+            <a:spAutoFit/>
+          </a:bodyPr>
+          <a:lstStyle/>
+          <a:p>
+            <a:pPr>
+              <a:defRPr sz="2400" b="1">
+                <a:solidFill>
+                  <a:srgbClr val="0072C6"/>
+                </a:solidFill>
+                <a:latin typeface="Segoe UI"/>
+              </a:defRPr>
+            </a:pPr>
+            <a:r>
+              <a:rPr dirty="0"/>
+              <a:t>Visual Creator captures 99 of 180 users - single use case driving </a:t>
+            </a:r>
+            <a:r>
+              <a:rPr lang="en-US" dirty="0"/>
+              <a:t>a majority of adoption</a:t>
+            </a:r>
+            <a:endParaRPr dirty="0"/>
+          </a:p>
+        </p:txBody>
+      </p:sp>
+      <p:pic>
+        <p:nvPicPr>
+          <p:cNvPr id="3" name="Picture 2" descr="temp_agents_habits.png"/>
+          <p:cNvPicPr>
+            <a:picLocks noChangeAspect="1"/>
+          </p:cNvPicPr>
+          <p:nvPr/>
+        </p:nvPicPr>
+        <p:blipFill>
+          <a:blip r:embed="rId2"/>
+          <a:stretch>
+            <a:fillRect/>
+          </a:stretch>
+        </p:blipFill>
+        <p:spPr>
+          <a:xfrm>
+            <a:off x="457200" y="1371600"/>
+            <a:ext cx="6858000" cy="3911203"/>
+          </a:xfrm>
+          <a:prstGeom prst="rect">
+            <a:avLst/>
+          </a:prstGeom>
+          <a:ln w="25400">
+            <a:solidFill>
+              <a:srgbClr val="0072C6"/>
+            </a:solidFill>
+          </a:ln>
+        </p:spPr>
+      </p:pic>
+      <p:sp>
+        <p:nvSpPr>
+          <p:cNvPr id="4" name="TextBox 3"/>
+          <p:cNvSpPr txBox="1"/>
+          <p:nvPr/>
+        </p:nvSpPr>
+        <p:spPr>
+          <a:xfrm>
+            <a:off x="7589520" y="1371600"/>
+            <a:ext cx="4142232" cy="3108543"/>
+          </a:xfrm>
+          <a:prstGeom prst="rect">
+            <a:avLst/>
+          </a:prstGeom>
+          <a:noFill/>
+        </p:spPr>
+        <p:txBody>
+          <a:bodyPr wrap="square" anchor="t">
+            <a:spAutoFit/>
+          </a:bodyPr>
+          <a:lstStyle/>
+          <a:p>
+            <a:pPr>
+              <a:defRPr sz="1400">
+                <a:solidFill>
+                  <a:srgbClr val="002060"/>
+                </a:solidFill>
+                <a:latin typeface="Segoe UI"/>
+              </a:defRPr>
+            </a:pPr>
+            <a:r>
+              <a:rPr lang="en-US" b="1" dirty="0">
+                <a:solidFill>
+                  <a:srgbClr val="000000"/>
+                </a:solidFill>
+                <a:cs typeface="Segoe UI" panose="020B0502040204020203" pitchFamily="34" charset="0"/>
+              </a:rPr>
+              <a:t>Visual Creator concentrates most agent users</a:t>
+            </a:r>
+            <a:endParaRPr lang="en-US" dirty="0"/>
+          </a:p>
+          <a:p>
+            <a:pPr>
+              <a:defRPr sz="1400">
+                <a:solidFill>
+                  <a:srgbClr val="002060"/>
+                </a:solidFill>
+                <a:latin typeface="Segoe UI"/>
+              </a:defRPr>
+            </a:pPr>
+            <a:r>
+              <a:rPr lang="en-US" dirty="0">
+                <a:solidFill>
+                  <a:srgbClr val="000000"/>
+                </a:solidFill>
+                <a:cs typeface="Segoe UI" panose="020B0502040204020203" pitchFamily="34" charset="0"/>
+              </a:rPr>
+              <a:t>55% of Agent users concentrated in Visual Creator (656 actions) while other agents see minimal usage</a:t>
+            </a:r>
+          </a:p>
+          <a:p>
+            <a:pPr>
+              <a:defRPr sz="1400">
+                <a:solidFill>
+                  <a:srgbClr val="002060"/>
+                </a:solidFill>
+                <a:latin typeface="Segoe UI"/>
+              </a:defRPr>
+            </a:pPr>
+            <a:endParaRPr lang="en-US" sz="1400" b="1" dirty="0">
+              <a:solidFill>
+                <a:srgbClr val="000000"/>
+              </a:solidFill>
+              <a:latin typeface="Segoe UI" panose="020B0502040204020203" pitchFamily="34" charset="0"/>
+              <a:cs typeface="Segoe UI" panose="020B0502040204020203" pitchFamily="34" charset="0"/>
+            </a:endParaRPr>
+          </a:p>
+          <a:p>
+            <a:pPr>
+              <a:defRPr sz="1400">
+                <a:solidFill>
+                  <a:srgbClr val="002060"/>
+                </a:solidFill>
+                <a:latin typeface="Segoe UI"/>
+              </a:defRPr>
+            </a:pPr>
+            <a:r>
+              <a:rPr lang="en-US" sz="1400" b="1" dirty="0">
+                <a:solidFill>
+                  <a:srgbClr val="000000"/>
+                </a:solidFill>
+                <a:latin typeface="Segoe UI" panose="020B0502040204020203" pitchFamily="34" charset="0"/>
+                <a:cs typeface="Segoe UI" panose="020B0502040204020203" pitchFamily="34" charset="0"/>
+              </a:rPr>
+              <a:t>IT</a:t>
+            </a:r>
+            <a:r>
+              <a:rPr lang="en-US" b="1" dirty="0">
+                <a:solidFill>
+                  <a:srgbClr val="000000"/>
+                </a:solidFill>
+                <a:cs typeface="Segoe UI" panose="020B0502040204020203" pitchFamily="34" charset="0"/>
+              </a:rPr>
+              <a:t> Service Agent shows high usage depth</a:t>
+            </a:r>
+            <a:endParaRPr lang="en-US" dirty="0"/>
+          </a:p>
+          <a:p>
+            <a:pPr>
+              <a:defRPr sz="1400">
+                <a:solidFill>
+                  <a:srgbClr val="002060"/>
+                </a:solidFill>
+                <a:latin typeface="Segoe UI"/>
+              </a:defRPr>
+            </a:pPr>
+            <a:r>
+              <a:rPr lang="en-US" dirty="0">
+                <a:solidFill>
+                  <a:srgbClr val="000000"/>
+                </a:solidFill>
+                <a:cs typeface="Segoe UI" panose="020B0502040204020203" pitchFamily="34" charset="0"/>
+              </a:rPr>
+              <a:t>IT Service Agent (9 users, 323 actions) shows depth potential with high actions per engaged user</a:t>
+            </a:r>
+          </a:p>
+          <a:p>
+            <a:pPr>
+              <a:defRPr sz="1400">
+                <a:solidFill>
+                  <a:srgbClr val="002060"/>
+                </a:solidFill>
+                <a:latin typeface="Segoe UI"/>
+              </a:defRPr>
+            </a:pPr>
+            <a:endParaRPr lang="en-US" b="1" dirty="0">
+              <a:solidFill>
+                <a:srgbClr val="000000"/>
+              </a:solidFill>
+              <a:cs typeface="Segoe UI" panose="020B0502040204020203" pitchFamily="34" charset="0"/>
+            </a:endParaRPr>
+          </a:p>
+          <a:p>
+            <a:pPr>
+              <a:defRPr sz="1400">
+                <a:solidFill>
+                  <a:srgbClr val="002060"/>
+                </a:solidFill>
+                <a:latin typeface="Segoe UI"/>
+              </a:defRPr>
+            </a:pPr>
+            <a:r>
+              <a:rPr lang="en-US" b="1" dirty="0">
+                <a:solidFill>
+                  <a:srgbClr val="000000"/>
+                </a:solidFill>
+                <a:cs typeface="Segoe UI" panose="020B0502040204020203" pitchFamily="34" charset="0"/>
+              </a:rPr>
+              <a:t>Agent value seen as single-purpose today</a:t>
+            </a:r>
+            <a:endParaRPr lang="en-US" dirty="0">
+              <a:solidFill>
+                <a:srgbClr val="002060"/>
+              </a:solidFill>
+            </a:endParaRPr>
+          </a:p>
+          <a:p>
+            <a:pPr>
+              <a:defRPr sz="1400">
+                <a:solidFill>
+                  <a:srgbClr val="002060"/>
+                </a:solidFill>
+                <a:latin typeface="Segoe UI"/>
+              </a:defRPr>
+            </a:pPr>
+            <a:r>
+              <a:rPr lang="en-US" sz="1400" dirty="0">
+                <a:solidFill>
+                  <a:srgbClr val="000000"/>
+                </a:solidFill>
+                <a:latin typeface="Segoe UI" panose="020B0502040204020203" pitchFamily="34" charset="0"/>
+                <a:cs typeface="Segoe UI" panose="020B0502040204020203" pitchFamily="34" charset="0"/>
+              </a:rPr>
+              <a:t>Concentration risk: Agent value proposition currently perceived as single-purpose vs. platform capability</a:t>
+            </a:r>
+            <a:endParaRPr lang="en-US" dirty="0">
+              <a:solidFill>
+                <a:srgbClr val="002060"/>
+              </a:solidFill>
+            </a:endParaRPr>
+          </a:p>
+        </p:txBody>
+      </p:sp>
+    </p:spTree>
+  </p:cSld>
+  <p:clrMapOvr>
+    <a:masterClrMapping/>
+  </p:clrMapOvr>
+</p:sld>
+</file>
+
+<file path=ppt/slides/slide7.xml><?xml version="1.0" encoding="utf-8"?>
+<p:sld xmlns:a="http://schemas.openxmlformats.org/drawingml/2006/main" xmlns:r="http://schemas.openxmlformats.org/officeDocument/2006/relationships" xmlns:p="http://schemas.openxmlformats.org/presentationml/2006/main">
+  <p:cSld>
+    <p:spTree>
+      <p:nvGrpSpPr>
+        <p:cNvPr id="1" name=""/>
+        <p:cNvGrpSpPr/>
+        <p:nvPr/>
+      </p:nvGrpSpPr>
+      <p:grpSpPr>
+        <a:xfrm>
+          <a:off x="0" y="0"/>
+          <a:ext cx="0" cy="0"/>
+          <a:chOff x="0" y="0"/>
+          <a:chExt cx="0" cy="0"/>
+        </a:xfrm>
+      </p:grpSpPr>
+      <p:sp>
+        <p:nvSpPr>
+          <p:cNvPr id="2" name="TextBox 1"/>
+          <p:cNvSpPr txBox="1"/>
+          <p:nvPr/>
+        </p:nvSpPr>
+        <p:spPr>
+          <a:xfrm>
+            <a:off x="457200" y="457200"/>
+            <a:ext cx="10972800" cy="640080"/>
+          </a:xfrm>
+          <a:prstGeom prst="rect">
+            <a:avLst/>
+          </a:prstGeom>
+          <a:noFill/>
+        </p:spPr>
+        <p:txBody>
+          <a:bodyPr wrap="square">
+            <a:spAutoFit/>
+          </a:bodyPr>
+          <a:lstStyle/>
+          <a:p>
+            <a:pPr>
+              <a:defRPr sz="2400" b="1">
+                <a:solidFill>
+                  <a:srgbClr val="0072C6"/>
+                </a:solidFill>
+                <a:latin typeface="Segoe UI"/>
+              </a:defRPr>
+            </a:pPr>
+            <a:r>
+              <a:t>Finance, IT, and Legal unlicensed power users represent immediate ROI upgrade targets</a:t>
             </a:r>
           </a:p>
         </p:txBody>
@@ -3283,7 +4796,7 @@
         <p:spPr>
           <a:xfrm>
             <a:off x="7589520" y="1371600"/>
-            <a:ext cx="4142232" cy="4572000"/>
+            <a:ext cx="4142232" cy="1908215"/>
           </a:xfrm>
           <a:prstGeom prst="rect">
             <a:avLst/>
@@ -3308,7 +4821,15 @@
               </a:defRPr>
             </a:pPr>
             <a:r>
-              <a:t>2,585 unlicensed users generating 203K actions (27 prompts/user/month avg) validate core value proposition</a:t>
+              <a:rPr lang="en-US" b="1" dirty="0"/>
+              <a:t>Large unlicensed user base with high activity</a:t>
+            </a:r>
+            <a:br>
+              <a:rPr lang="en-US" dirty="0"/>
+            </a:br>
+            <a:r>
+              <a:rPr lang="en-US" dirty="0"/>
+              <a:t>2,585 unlicensed users; 203K actions (27 prompts/user/month avg)</a:t>
             </a:r>
           </a:p>
           <a:p>
@@ -3324,7 +4845,8 @@
               </a:defRPr>
             </a:pPr>
             <a:r>
-              <a:t>Activity concentration in Finance, Legal, Operations suggests enterprise use cases ready for M365 integration</a:t>
+              <a:rPr lang="en-US" dirty="0"/>
+              <a:t>Activity concentration in Finance, Legal, Operations</a:t>
             </a:r>
           </a:p>
           <a:p>
@@ -3340,7 +4862,24 @@
               </a:defRPr>
             </a:pPr>
             <a:r>
-              <a:t>License strategy: Target departments with 25+ prompts/user and 4+ active days as conversion priority</a:t>
+              <a:rPr lang="en-US" sz="1400" b="1" dirty="0">
+                <a:solidFill>
+                  <a:srgbClr val="002060"/>
+                </a:solidFill>
+                <a:latin typeface="Segoe UI" panose="020B0502040204020203" pitchFamily="34" charset="0"/>
+              </a:rPr>
+              <a:t>Conversion</a:t>
+            </a:r>
+            <a:r>
+              <a:rPr lang="en-US" b="1" dirty="0"/>
+              <a:t> focus: 25+ prompts and 4+ days</a:t>
+            </a:r>
+            <a:br>
+              <a:rPr lang="en-US" dirty="0"/>
+            </a:br>
+            <a:r>
+              <a:rPr lang="en-US" dirty="0"/>
+              <a:t>25+ prompts/user and 4+ active days</a:t>
             </a:r>
           </a:p>
         </p:txBody>
@@ -3353,24 +4892,23 @@
 </p:sld>
 </file>
 
-<file path=ppt/slides/slide11.xml><?xml version="1.0" encoding="utf-8"?>
-<p:sld xmlns:a="http://schemas.openxmlformats.org/drawingml/2006/main" xmlns:p="http://schemas.openxmlformats.org/presentationml/2006/main" xmlns:r="http://schemas.openxmlformats.org/officeDocument/2006/relationships">
+<file path=ppt/slides/slide8.xml><?xml version="1.0" encoding="utf-8"?>
+<p:sld xmlns:a="http://schemas.openxmlformats.org/drawingml/2006/main" xmlns:r="http://schemas.openxmlformats.org/officeDocument/2006/relationships" xmlns:p="http://schemas.openxmlformats.org/presentationml/2006/main">
   <p:cSld>
-    <p:bg>
-      <p:bgPr>
-        <a:solidFill>
-          <a:srgbClr val="F5EFE7"/>
-        </a:solidFill>
-        <a:effectLst/>
-      </p:bgPr>
-    </p:bg>
     <p:spTree>
       <p:nvGrpSpPr>
         <p:cNvPr id="1" name=""/>
         <p:cNvGrpSpPr/>
         <p:nvPr/>
       </p:nvGrpSpPr>
-      <p:grpSpPr/>
+      <p:grpSpPr>
+        <a:xfrm>
+          <a:off x="0" y="0"/>
+          <a:ext cx="0" cy="0"/>
+          <a:chOff x="0" y="0"/>
+          <a:chExt cx="0" cy="0"/>
+        </a:xfrm>
+      </p:grpSpPr>
       <p:sp>
         <p:nvSpPr>
           <p:cNvPr id="2" name="TextBox 1"/>
@@ -3415,24 +4953,23 @@
 </p:sld>
 </file>
 
-<file path=ppt/slides/slide12.xml><?xml version="1.0" encoding="utf-8"?>
-<p:sld xmlns:a="http://schemas.openxmlformats.org/drawingml/2006/main" xmlns:p="http://schemas.openxmlformats.org/presentationml/2006/main" xmlns:r="http://schemas.openxmlformats.org/officeDocument/2006/relationships">
+<file path=ppt/slides/slide9.xml><?xml version="1.0" encoding="utf-8"?>
+<p:sld xmlns:a="http://schemas.openxmlformats.org/drawingml/2006/main" xmlns:r="http://schemas.openxmlformats.org/officeDocument/2006/relationships" xmlns:p="http://schemas.openxmlformats.org/presentationml/2006/main">
   <p:cSld>
-    <p:bg>
-      <p:bgPr>
-        <a:solidFill>
-          <a:srgbClr val="F5EFE7"/>
-        </a:solidFill>
-        <a:effectLst/>
-      </p:bgPr>
-    </p:bg>
     <p:spTree>
       <p:nvGrpSpPr>
         <p:cNvPr id="1" name=""/>
         <p:cNvGrpSpPr/>
         <p:nvPr/>
       </p:nvGrpSpPr>
-      <p:grpSpPr/>
+      <p:grpSpPr>
+        <a:xfrm>
+          <a:off x="0" y="0"/>
+          <a:ext cx="0" cy="0"/>
+          <a:chOff x="0" y="0"/>
+          <a:chExt cx="0" cy="0"/>
+        </a:xfrm>
+      </p:grpSpPr>
       <p:sp>
         <p:nvSpPr>
           <p:cNvPr id="2" name="TextBox 1"/>
@@ -3442,7 +4979,7 @@
         <p:spPr>
           <a:xfrm>
             <a:off x="457200" y="457200"/>
-            <a:ext cx="10972800" cy="640080"/>
+            <a:ext cx="10972800" cy="461665"/>
           </a:xfrm>
           <a:prstGeom prst="rect">
             <a:avLst/>
@@ -3464,8 +5001,10 @@
               </a:defRPr>
             </a:pPr>
             <a:r>
-              <a:t>Action 1: Launch targeted Agent awareness campaign to 96% who have never tried</a:t>
-            </a:r>
+              <a:rPr lang="en-US" dirty="0"/>
+              <a:t>Recommendations and Next Steps</a:t>
+            </a:r>
+            <a:endParaRPr dirty="0"/>
           </a:p>
         </p:txBody>
       </p:sp>
@@ -3477,8 +5016,8 @@
         </p:nvSpPr>
         <p:spPr>
           <a:xfrm>
-            <a:off x="457200" y="1371600"/>
-            <a:ext cx="10972800" cy="3657600"/>
+            <a:off x="457200" y="1073888"/>
+            <a:ext cx="10972800" cy="5278368"/>
           </a:xfrm>
           <a:prstGeom prst="rect">
             <a:avLst/>
@@ -3492,8 +5031,11 @@
           <a:lstStyle/>
           <a:p>
             <a:pPr>
+              <a:spcBef>
+                <a:spcPts val="300"/>
+              </a:spcBef>
               <a:spcAft>
-                <a:spcPts val="1000"/>
+                <a:spcPts val="300"/>
               </a:spcAft>
               <a:defRPr sz="1400">
                 <a:solidFill>
@@ -3503,13 +5045,83 @@
               </a:defRPr>
             </a:pPr>
             <a:r>
-              <a:t>Launch department-specific Agent showcases in Finance and Legal (highest current success)</a:t>
+              <a:rPr lang="en-US" b="1" dirty="0"/>
+              <a:t>Data reveals adoption paradox: strong platform reach with weak Agent engagement</a:t>
+            </a:r>
+          </a:p>
+          <a:p>
+            <a:pPr marL="285750" indent="-285750">
+              <a:spcBef>
+                <a:spcPts val="300"/>
+              </a:spcBef>
+              <a:spcAft>
+                <a:spcPts val="300"/>
+              </a:spcAft>
+              <a:buFont typeface="Arial" panose="020B0604020202020204" pitchFamily="34" charset="0"/>
+              <a:buChar char="•"/>
+              <a:defRPr sz="1400">
+                <a:solidFill>
+                  <a:srgbClr val="002060"/>
+                </a:solidFill>
+                <a:latin typeface="Segoe UI"/>
+              </a:defRPr>
+            </a:pPr>
+            <a:r>
+              <a:rPr lang="en-US" dirty="0"/>
+              <a:t>Current state: 4,381 Copilot users but only 4% trying Agents, 87% infrequent usage, 203K unlicensed actions</a:t>
+            </a:r>
+          </a:p>
+          <a:p>
+            <a:pPr marL="285750" indent="-285750">
+              <a:spcBef>
+                <a:spcPts val="300"/>
+              </a:spcBef>
+              <a:spcAft>
+                <a:spcPts val="300"/>
+              </a:spcAft>
+              <a:buFont typeface="Arial" panose="020B0604020202020204" pitchFamily="34" charset="0"/>
+              <a:buChar char="•"/>
+              <a:defRPr sz="1400">
+                <a:solidFill>
+                  <a:srgbClr val="002060"/>
+                </a:solidFill>
+                <a:latin typeface="Segoe UI"/>
+              </a:defRPr>
+            </a:pPr>
+            <a:r>
+              <a:rPr lang="en-US" dirty="0"/>
+              <a:t>Three priorities: Agent awareness blitz, habit formation program, strategic license upgrades (Finance/IT/Legal)</a:t>
+            </a:r>
+          </a:p>
+          <a:p>
+            <a:pPr marL="285750" indent="-285750">
+              <a:spcBef>
+                <a:spcPts val="300"/>
+              </a:spcBef>
+              <a:spcAft>
+                <a:spcPts val="300"/>
+              </a:spcAft>
+              <a:buFont typeface="Arial" panose="020B0604020202020204" pitchFamily="34" charset="0"/>
+              <a:buChar char="•"/>
+              <a:defRPr sz="1400">
+                <a:solidFill>
+                  <a:srgbClr val="002060"/>
+                </a:solidFill>
+                <a:latin typeface="Segoe UI"/>
+              </a:defRPr>
+            </a:pPr>
+            <a:r>
+              <a:rPr lang="en-US" dirty="0"/>
+              <a:t>Success metrics: Track Agent penetration, daily user %, and license conversion rate monthly through Q2 2026</a:t>
             </a:r>
           </a:p>
           <a:p>
             <a:pPr>
+              <a:spcBef>
+                <a:spcPts val="300"/>
+              </a:spcBef>
               <a:spcAft>
-                <a:spcPts val="1000"/>
+                <a:spcPts val="300"/>
               </a:spcAft>
               <a:defRPr sz="1400">
                 <a:solidFill>
@@ -3518,14 +5130,15 @@
                 <a:latin typeface="Segoe UI"/>
               </a:defRPr>
             </a:pPr>
-            <a:r>
-              <a:t>Deploy Visual Creator quick-start guides to all 2,585 unlicensed users as gateway drug to platform</a:t>
-            </a:r>
+            <a:endParaRPr lang="en-US" b="1" dirty="0"/>
           </a:p>
           <a:p>
             <a:pPr>
+              <a:spcBef>
+                <a:spcPts val="300"/>
+              </a:spcBef>
               <a:spcAft>
-                <a:spcPts val="1000"/>
+                <a:spcPts val="300"/>
               </a:spcAft>
               <a:defRPr sz="1400">
                 <a:solidFill>
@@ -3535,98 +5148,103 @@
               </a:defRPr>
             </a:pPr>
             <a:r>
+              <a:rPr lang="en-US" b="1" dirty="0"/>
+              <a:t>Action 1: Launch targeted Agent awareness campaign to 96% who have never tried</a:t>
+            </a:r>
+          </a:p>
+          <a:p>
+            <a:pPr marL="285750" indent="-285750">
+              <a:spcBef>
+                <a:spcPts val="300"/>
+              </a:spcBef>
+              <a:spcAft>
+                <a:spcPts val="300"/>
+              </a:spcAft>
+              <a:buFont typeface="Arial" panose="020B0604020202020204" pitchFamily="34" charset="0"/>
+              <a:buChar char="•"/>
+              <a:defRPr sz="1400">
+                <a:solidFill>
+                  <a:srgbClr val="002060"/>
+                </a:solidFill>
+                <a:latin typeface="Segoe UI"/>
+              </a:defRPr>
+            </a:pPr>
+            <a:r>
+              <a:rPr dirty="0"/>
+              <a:t>Launch department-specific Agent showcases in Finance and Legal (highest current success)</a:t>
+            </a:r>
+          </a:p>
+          <a:p>
+            <a:pPr marL="285750" indent="-285750">
+              <a:spcBef>
+                <a:spcPts val="300"/>
+              </a:spcBef>
+              <a:spcAft>
+                <a:spcPts val="300"/>
+              </a:spcAft>
+              <a:buFont typeface="Arial" panose="020B0604020202020204" pitchFamily="34" charset="0"/>
+              <a:buChar char="•"/>
+              <a:defRPr sz="1400">
+                <a:solidFill>
+                  <a:srgbClr val="002060"/>
+                </a:solidFill>
+                <a:latin typeface="Segoe UI"/>
+              </a:defRPr>
+            </a:pPr>
+            <a:r>
+              <a:rPr dirty="0"/>
+              <a:t>Deploy Visual Creator quick-start guides to all 2,585 unlicensed users as gateway drug to platform</a:t>
+            </a:r>
+          </a:p>
+          <a:p>
+            <a:pPr marL="285750" indent="-285750">
+              <a:spcBef>
+                <a:spcPts val="300"/>
+              </a:spcBef>
+              <a:spcAft>
+                <a:spcPts val="300"/>
+              </a:spcAft>
+              <a:buFont typeface="Arial" panose="020B0604020202020204" pitchFamily="34" charset="0"/>
+              <a:buChar char="•"/>
+              <a:defRPr sz="1400">
+                <a:solidFill>
+                  <a:srgbClr val="002060"/>
+                </a:solidFill>
+                <a:latin typeface="Segoe UI"/>
+              </a:defRPr>
+            </a:pPr>
+            <a:r>
+              <a:rPr dirty="0"/>
               <a:t>Establish Agent champions program in departments showing &gt;10 actions/user to evangelize use cases</a:t>
             </a:r>
-          </a:p>
-        </p:txBody>
-      </p:sp>
-    </p:spTree>
-  </p:cSld>
-  <p:clrMapOvr>
-    <a:masterClrMapping/>
-  </p:clrMapOvr>
-</p:sld>
-</file>
-
-<file path=ppt/slides/slide13.xml><?xml version="1.0" encoding="utf-8"?>
-<p:sld xmlns:a="http://schemas.openxmlformats.org/drawingml/2006/main" xmlns:p="http://schemas.openxmlformats.org/presentationml/2006/main" xmlns:r="http://schemas.openxmlformats.org/officeDocument/2006/relationships">
-  <p:cSld>
-    <p:bg>
-      <p:bgPr>
-        <a:solidFill>
-          <a:srgbClr val="F5EFE7"/>
-        </a:solidFill>
-        <a:effectLst/>
-      </p:bgPr>
-    </p:bg>
-    <p:spTree>
-      <p:nvGrpSpPr>
-        <p:cNvPr id="1" name=""/>
-        <p:cNvGrpSpPr/>
-        <p:nvPr/>
-      </p:nvGrpSpPr>
-      <p:grpSpPr/>
-      <p:sp>
-        <p:nvSpPr>
-          <p:cNvPr id="2" name="TextBox 1"/>
-          <p:cNvSpPr txBox="1"/>
-          <p:nvPr/>
-        </p:nvSpPr>
-        <p:spPr>
-          <a:xfrm>
-            <a:off x="457200" y="457200"/>
-            <a:ext cx="10972800" cy="640080"/>
-          </a:xfrm>
-          <a:prstGeom prst="rect">
-            <a:avLst/>
-          </a:prstGeom>
-          <a:noFill/>
-        </p:spPr>
-        <p:txBody>
-          <a:bodyPr wrap="square">
-            <a:spAutoFit/>
-          </a:bodyPr>
-          <a:lstStyle/>
+            <a:endParaRPr lang="en-US" dirty="0"/>
+          </a:p>
+          <a:p>
+            <a:pPr marL="285750" indent="-285750">
+              <a:spcBef>
+                <a:spcPts val="300"/>
+              </a:spcBef>
+              <a:spcAft>
+                <a:spcPts val="300"/>
+              </a:spcAft>
+              <a:buFont typeface="Arial" panose="020B0604020202020204" pitchFamily="34" charset="0"/>
+              <a:buChar char="•"/>
+              <a:defRPr sz="1400">
+                <a:solidFill>
+                  <a:srgbClr val="002060"/>
+                </a:solidFill>
+                <a:latin typeface="Segoe UI"/>
+              </a:defRPr>
+            </a:pPr>
+            <a:endParaRPr lang="en-US" dirty="0"/>
+          </a:p>
           <a:p>
             <a:pPr>
-              <a:defRPr sz="2400" b="1">
-                <a:solidFill>
-                  <a:srgbClr val="0072C6"/>
-                </a:solidFill>
-                <a:latin typeface="Segoe UI"/>
-              </a:defRPr>
-            </a:pPr>
-            <a:r>
-              <a:t>Action 2: Implement 30-day habit formation program to convert infrequent to frequent users</a:t>
-            </a:r>
-          </a:p>
-        </p:txBody>
-      </p:sp>
-      <p:sp>
-        <p:nvSpPr>
-          <p:cNvPr id="3" name="TextBox 2"/>
-          <p:cNvSpPr txBox="1"/>
-          <p:nvPr/>
-        </p:nvSpPr>
-        <p:spPr>
-          <a:xfrm>
-            <a:off x="457200" y="1371600"/>
-            <a:ext cx="10972800" cy="3657600"/>
-          </a:xfrm>
-          <a:prstGeom prst="rect">
-            <a:avLst/>
-          </a:prstGeom>
-          <a:noFill/>
-        </p:spPr>
-        <p:txBody>
-          <a:bodyPr wrap="square">
-            <a:spAutoFit/>
-          </a:bodyPr>
-          <a:lstStyle/>
-          <a:p>
-            <a:pPr>
+              <a:spcBef>
+                <a:spcPts val="300"/>
+              </a:spcBef>
               <a:spcAft>
-                <a:spcPts val="1000"/>
+                <a:spcPts val="300"/>
               </a:spcAft>
               <a:defRPr sz="1400">
                 <a:solidFill>
@@ -3636,13 +5254,61 @@
               </a:defRPr>
             </a:pPr>
             <a:r>
-              <a:t>Design daily use case prompts for Finance (16 actions/user) to push from infrequent to frequent tier</a:t>
+              <a:rPr lang="en-US" b="1" dirty="0"/>
+              <a:t>Action 2: Convert proven unlicensed power users to revenue-generating licensed customers</a:t>
+            </a:r>
+          </a:p>
+          <a:p>
+            <a:pPr marL="285750" indent="-285750">
+              <a:spcBef>
+                <a:spcPts val="300"/>
+              </a:spcBef>
+              <a:spcAft>
+                <a:spcPts val="300"/>
+              </a:spcAft>
+              <a:buFont typeface="Arial" panose="020B0604020202020204" pitchFamily="34" charset="0"/>
+              <a:buChar char="•"/>
+              <a:defRPr sz="1400">
+                <a:solidFill>
+                  <a:srgbClr val="002060"/>
+                </a:solidFill>
+                <a:latin typeface="Segoe UI"/>
+              </a:defRPr>
+            </a:pPr>
+            <a:r>
+              <a:rPr lang="en-US" dirty="0"/>
+              <a:t>Phase 1: Upgrade Finance (324 users, 38 prompts/user) and Legal (314 users, 29 prompts/user) to M365 Copilot</a:t>
+            </a:r>
+          </a:p>
+          <a:p>
+            <a:pPr marL="285750" indent="-285750">
+              <a:spcBef>
+                <a:spcPts val="300"/>
+              </a:spcBef>
+              <a:spcAft>
+                <a:spcPts val="300"/>
+              </a:spcAft>
+              <a:buFont typeface="Arial" panose="020B0604020202020204" pitchFamily="34" charset="0"/>
+              <a:buChar char="•"/>
+              <a:defRPr sz="1400">
+                <a:solidFill>
+                  <a:srgbClr val="002060"/>
+                </a:solidFill>
+                <a:latin typeface="Segoe UI"/>
+              </a:defRPr>
+            </a:pPr>
+            <a:r>
+              <a:rPr lang="en-US" dirty="0"/>
+              <a:t>Target users with &gt;25 monthly prompts and &gt;4 active days as proven engaged audience for M365 features</a:t>
             </a:r>
           </a:p>
           <a:p>
             <a:pPr>
+              <a:spcBef>
+                <a:spcPts val="300"/>
+              </a:spcBef>
               <a:spcAft>
-                <a:spcPts val="1000"/>
+                <a:spcPts val="300"/>
               </a:spcAft>
               <a:defRPr sz="1400">
                 <a:solidFill>
@@ -3651,14 +5317,15 @@
                 <a:latin typeface="Segoe UI"/>
               </a:defRPr>
             </a:pPr>
-            <a:r>
-              <a:t>Create workflow integration guides showing how to embed Agent calls into existing business processes</a:t>
-            </a:r>
+            <a:endParaRPr lang="en-US" dirty="0"/>
           </a:p>
           <a:p>
             <a:pPr>
+              <a:spcBef>
+                <a:spcPts val="300"/>
+              </a:spcBef>
               <a:spcAft>
-                <a:spcPts val="1000"/>
+                <a:spcPts val="300"/>
               </a:spcAft>
               <a:defRPr sz="1400">
                 <a:solidFill>
@@ -3668,1473 +5335,74 @@
               </a:defRPr>
             </a:pPr>
             <a:r>
+              <a:rPr lang="en-US" b="1" dirty="0"/>
+              <a:t>Action 3: Implement 30-day habit formation program to convert infrequent to frequent users</a:t>
+            </a:r>
+          </a:p>
+          <a:p>
+            <a:pPr marL="285750" indent="-285750">
+              <a:spcBef>
+                <a:spcPts val="300"/>
+              </a:spcBef>
+              <a:spcAft>
+                <a:spcPts val="300"/>
+              </a:spcAft>
+              <a:buFont typeface="Arial" panose="020B0604020202020204" pitchFamily="34" charset="0"/>
+              <a:buChar char="•"/>
+              <a:defRPr sz="1400">
+                <a:solidFill>
+                  <a:srgbClr val="002060"/>
+                </a:solidFill>
+                <a:latin typeface="Segoe UI"/>
+              </a:defRPr>
+            </a:pPr>
+            <a:r>
+              <a:rPr lang="en-US" dirty="0"/>
+              <a:t>Design daily use case prompts for Finance (16 actions/user) to push from infrequent to frequent tier</a:t>
+            </a:r>
+          </a:p>
+          <a:p>
+            <a:pPr marL="285750" indent="-285750">
+              <a:spcBef>
+                <a:spcPts val="300"/>
+              </a:spcBef>
+              <a:spcAft>
+                <a:spcPts val="300"/>
+              </a:spcAft>
+              <a:buFont typeface="Arial" panose="020B0604020202020204" pitchFamily="34" charset="0"/>
+              <a:buChar char="•"/>
+              <a:defRPr sz="1400">
+                <a:solidFill>
+                  <a:srgbClr val="002060"/>
+                </a:solidFill>
+                <a:latin typeface="Segoe UI"/>
+              </a:defRPr>
+            </a:pPr>
+            <a:r>
+              <a:rPr lang="en-US" dirty="0"/>
+              <a:t>Create workflow integration guides showing how to embed Agent calls into existing business processes</a:t>
+            </a:r>
+          </a:p>
+          <a:p>
+            <a:pPr marL="285750" indent="-285750">
+              <a:spcBef>
+                <a:spcPts val="300"/>
+              </a:spcBef>
+              <a:spcAft>
+                <a:spcPts val="300"/>
+              </a:spcAft>
+              <a:buFont typeface="Arial" panose="020B0604020202020204" pitchFamily="34" charset="0"/>
+              <a:buChar char="•"/>
+              <a:defRPr sz="1400">
+                <a:solidFill>
+                  <a:srgbClr val="002060"/>
+                </a:solidFill>
+                <a:latin typeface="Segoe UI"/>
+              </a:defRPr>
+            </a:pPr>
+            <a:r>
+              <a:rPr lang="en-US" dirty="0"/>
               <a:t>Set target: Move 20% of 101 infrequent users to moderate tier (6-10 days/month) within 90 days</a:t>
-            </a:r>
-          </a:p>
-        </p:txBody>
-      </p:sp>
-    </p:spTree>
-  </p:cSld>
-  <p:clrMapOvr>
-    <a:masterClrMapping/>
-  </p:clrMapOvr>
-</p:sld>
-</file>
-
-<file path=ppt/slides/slide14.xml><?xml version="1.0" encoding="utf-8"?>
-<p:sld xmlns:a="http://schemas.openxmlformats.org/drawingml/2006/main" xmlns:p="http://schemas.openxmlformats.org/presentationml/2006/main" xmlns:r="http://schemas.openxmlformats.org/officeDocument/2006/relationships">
-  <p:cSld>
-    <p:bg>
-      <p:bgPr>
-        <a:solidFill>
-          <a:srgbClr val="F5EFE7"/>
-        </a:solidFill>
-        <a:effectLst/>
-      </p:bgPr>
-    </p:bg>
-    <p:spTree>
-      <p:nvGrpSpPr>
-        <p:cNvPr id="1" name=""/>
-        <p:cNvGrpSpPr/>
-        <p:nvPr/>
-      </p:nvGrpSpPr>
-      <p:grpSpPr/>
-      <p:sp>
-        <p:nvSpPr>
-          <p:cNvPr id="2" name="TextBox 1"/>
-          <p:cNvSpPr txBox="1"/>
-          <p:nvPr/>
-        </p:nvSpPr>
-        <p:spPr>
-          <a:xfrm>
-            <a:off x="457200" y="457200"/>
-            <a:ext cx="10972800" cy="640080"/>
-          </a:xfrm>
-          <a:prstGeom prst="rect">
-            <a:avLst/>
-          </a:prstGeom>
-          <a:noFill/>
-        </p:spPr>
-        <p:txBody>
-          <a:bodyPr wrap="square">
-            <a:spAutoFit/>
-          </a:bodyPr>
-          <a:lstStyle/>
-          <a:p>
-            <a:pPr>
-              <a:defRPr sz="2400" b="1">
-                <a:solidFill>
-                  <a:srgbClr val="0072C6"/>
-                </a:solidFill>
-                <a:latin typeface="Segoe UI"/>
-              </a:defRPr>
-            </a:pPr>
-            <a:r>
-              <a:t>Action 3: Prioritize 900+ Finance/IT/Legal users for M365 license upgrades</a:t>
-            </a:r>
-          </a:p>
-        </p:txBody>
-      </p:sp>
-      <p:sp>
-        <p:nvSpPr>
-          <p:cNvPr id="3" name="TextBox 2"/>
-          <p:cNvSpPr txBox="1"/>
-          <p:nvPr/>
-        </p:nvSpPr>
-        <p:spPr>
-          <a:xfrm>
-            <a:off x="457200" y="1371600"/>
-            <a:ext cx="10972800" cy="3657600"/>
-          </a:xfrm>
-          <a:prstGeom prst="rect">
-            <a:avLst/>
-          </a:prstGeom>
-          <a:noFill/>
-        </p:spPr>
-        <p:txBody>
-          <a:bodyPr wrap="square">
-            <a:spAutoFit/>
-          </a:bodyPr>
-          <a:lstStyle/>
-          <a:p>
-            <a:pPr>
-              <a:spcAft>
-                <a:spcPts val="1000"/>
-              </a:spcAft>
-              <a:defRPr sz="1400">
-                <a:solidFill>
-                  <a:srgbClr val="002060"/>
-                </a:solidFill>
-                <a:latin typeface="Segoe UI"/>
-              </a:defRPr>
-            </a:pPr>
-            <a:r>
-              <a:t>Phase 1: Upgrade Finance (324 users, 38 prompts/user) and Legal (314 users, 29 prompts/user) high-value cohort</a:t>
-            </a:r>
-          </a:p>
-          <a:p>
-            <a:pPr>
-              <a:spcAft>
-                <a:spcPts val="1000"/>
-              </a:spcAft>
-              <a:defRPr sz="1400">
-                <a:solidFill>
-                  <a:srgbClr val="002060"/>
-                </a:solidFill>
-                <a:latin typeface="Segoe UI"/>
-              </a:defRPr>
-            </a:pPr>
-            <a:r>
-              <a:t>Target users with &gt;25 monthly prompts and &gt;4 active days as proven engaged audience for M365 features</a:t>
-            </a:r>
-          </a:p>
-          <a:p>
-            <a:pPr>
-              <a:spcAft>
-                <a:spcPts val="1000"/>
-              </a:spcAft>
-              <a:defRPr sz="1400">
-                <a:solidFill>
-                  <a:srgbClr val="002060"/>
-                </a:solidFill>
-                <a:latin typeface="Segoe UI"/>
-              </a:defRPr>
-            </a:pPr>
-            <a:r>
-              <a:t>Expected outcome: Convert proven unlicensed power users to revenue-generating licensed customers</a:t>
-            </a:r>
-          </a:p>
-        </p:txBody>
-      </p:sp>
-    </p:spTree>
-  </p:cSld>
-  <p:clrMapOvr>
-    <a:masterClrMapping/>
-  </p:clrMapOvr>
-</p:sld>
-</file>
-
-<file path=ppt/slides/slide15.xml><?xml version="1.0" encoding="utf-8"?>
-<p:sld xmlns:a="http://schemas.openxmlformats.org/drawingml/2006/main" xmlns:p="http://schemas.openxmlformats.org/presentationml/2006/main" xmlns:r="http://schemas.openxmlformats.org/officeDocument/2006/relationships">
-  <p:cSld>
-    <p:bg>
-      <p:bgPr>
-        <a:solidFill>
-          <a:srgbClr val="F5EFE7"/>
-        </a:solidFill>
-        <a:effectLst/>
-      </p:bgPr>
-    </p:bg>
-    <p:spTree>
-      <p:nvGrpSpPr>
-        <p:cNvPr id="1" name=""/>
-        <p:cNvGrpSpPr/>
-        <p:nvPr/>
-      </p:nvGrpSpPr>
-      <p:grpSpPr/>
-      <p:sp>
-        <p:nvSpPr>
-          <p:cNvPr id="2" name="TextBox 1"/>
-          <p:cNvSpPr txBox="1"/>
-          <p:nvPr/>
-        </p:nvSpPr>
-        <p:spPr>
-          <a:xfrm>
-            <a:off x="457200" y="457200"/>
-            <a:ext cx="10972800" cy="640080"/>
-          </a:xfrm>
-          <a:prstGeom prst="rect">
-            <a:avLst/>
-          </a:prstGeom>
-          <a:noFill/>
-        </p:spPr>
-        <p:txBody>
-          <a:bodyPr wrap="square">
-            <a:spAutoFit/>
-          </a:bodyPr>
-          <a:lstStyle/>
-          <a:p>
-            <a:pPr>
-              <a:defRPr sz="2400" b="1">
-                <a:solidFill>
-                  <a:srgbClr val="0072C6"/>
-                </a:solidFill>
-                <a:latin typeface="Segoe UI"/>
-              </a:defRPr>
-            </a:pPr>
-            <a:r>
-              <a:t>Expected outcomes: 10x Agent adoption, 50% habit formation improvement, 900 license conversions</a:t>
-            </a:r>
-          </a:p>
-        </p:txBody>
-      </p:sp>
-      <p:sp>
-        <p:nvSpPr>
-          <p:cNvPr id="3" name="TextBox 2"/>
-          <p:cNvSpPr txBox="1"/>
-          <p:nvPr/>
-        </p:nvSpPr>
-        <p:spPr>
-          <a:xfrm>
-            <a:off x="457200" y="1371600"/>
-            <a:ext cx="10972800" cy="3657600"/>
-          </a:xfrm>
-          <a:prstGeom prst="rect">
-            <a:avLst/>
-          </a:prstGeom>
-          <a:noFill/>
-        </p:spPr>
-        <p:txBody>
-          <a:bodyPr wrap="square">
-            <a:spAutoFit/>
-          </a:bodyPr>
-          <a:lstStyle/>
-          <a:p>
-            <a:pPr>
-              <a:spcAft>
-                <a:spcPts val="1000"/>
-              </a:spcAft>
-              <a:defRPr sz="1400">
-                <a:solidFill>
-                  <a:srgbClr val="002060"/>
-                </a:solidFill>
-                <a:latin typeface="Segoe UI"/>
-              </a:defRPr>
-            </a:pPr>
-            <a:r>
-              <a:t>Agent adoption: From 180 to 1,800+ users (4% to 40% penetration) via awareness campaign and champion network</a:t>
-            </a:r>
-          </a:p>
-          <a:p>
-            <a:pPr>
-              <a:spcAft>
-                <a:spcPts val="1000"/>
-              </a:spcAft>
-              <a:defRPr sz="1400">
-                <a:solidFill>
-                  <a:srgbClr val="002060"/>
-                </a:solidFill>
-                <a:latin typeface="Segoe UI"/>
-              </a:defRPr>
-            </a:pPr>
-            <a:r>
-              <a:t>Habit formation: From 0% daily users to 15% daily users via 30-day integration program in Finance/Legal</a:t>
-            </a:r>
-          </a:p>
-          <a:p>
-            <a:pPr>
-              <a:spcAft>
-                <a:spcPts val="1000"/>
-              </a:spcAft>
-              <a:defRPr sz="1400">
-                <a:solidFill>
-                  <a:srgbClr val="002060"/>
-                </a:solidFill>
-                <a:latin typeface="Segoe UI"/>
-              </a:defRPr>
-            </a:pPr>
-            <a:r>
-              <a:t>License revenue: Convert 900 high-value unlicensed users in Finance/IT/Legal to M365 premium tier</a:t>
-            </a:r>
-          </a:p>
-        </p:txBody>
-      </p:sp>
-    </p:spTree>
-  </p:cSld>
-  <p:clrMapOvr>
-    <a:masterClrMapping/>
-  </p:clrMapOvr>
-</p:sld>
-</file>
-
-<file path=ppt/slides/slide16.xml><?xml version="1.0" encoding="utf-8"?>
-<p:sld xmlns:a="http://schemas.openxmlformats.org/drawingml/2006/main" xmlns:p="http://schemas.openxmlformats.org/presentationml/2006/main" xmlns:r="http://schemas.openxmlformats.org/officeDocument/2006/relationships">
-  <p:cSld>
-    <p:bg>
-      <p:bgPr>
-        <a:solidFill>
-          <a:srgbClr val="F5EFE7"/>
-        </a:solidFill>
-        <a:effectLst/>
-      </p:bgPr>
-    </p:bg>
-    <p:spTree>
-      <p:nvGrpSpPr>
-        <p:cNvPr id="1" name=""/>
-        <p:cNvGrpSpPr/>
-        <p:nvPr/>
-      </p:nvGrpSpPr>
-      <p:grpSpPr/>
-      <p:sp>
-        <p:nvSpPr>
-          <p:cNvPr id="2" name="TextBox 1"/>
-          <p:cNvSpPr txBox="1"/>
-          <p:nvPr/>
-        </p:nvSpPr>
-        <p:spPr>
-          <a:xfrm>
-            <a:off x="457200" y="457200"/>
-            <a:ext cx="10972800" cy="640080"/>
-          </a:xfrm>
-          <a:prstGeom prst="rect">
-            <a:avLst/>
-          </a:prstGeom>
-          <a:noFill/>
-        </p:spPr>
-        <p:txBody>
-          <a:bodyPr wrap="square">
-            <a:spAutoFit/>
-          </a:bodyPr>
-          <a:lstStyle/>
-          <a:p>
-            <a:pPr>
-              <a:defRPr sz="2400" b="1">
-                <a:solidFill>
-                  <a:srgbClr val="0072C6"/>
-                </a:solidFill>
-                <a:latin typeface="Segoe UI"/>
-              </a:defRPr>
-            </a:pPr>
-            <a:r>
-              <a:t>Data reveals adoption paradox: strong platform reach with weak Agent engagement</a:t>
-            </a:r>
-          </a:p>
-        </p:txBody>
-      </p:sp>
-      <p:sp>
-        <p:nvSpPr>
-          <p:cNvPr id="3" name="TextBox 2"/>
-          <p:cNvSpPr txBox="1"/>
-          <p:nvPr/>
-        </p:nvSpPr>
-        <p:spPr>
-          <a:xfrm>
-            <a:off x="457200" y="1371600"/>
-            <a:ext cx="10972800" cy="3657600"/>
-          </a:xfrm>
-          <a:prstGeom prst="rect">
-            <a:avLst/>
-          </a:prstGeom>
-          <a:noFill/>
-        </p:spPr>
-        <p:txBody>
-          <a:bodyPr wrap="square">
-            <a:spAutoFit/>
-          </a:bodyPr>
-          <a:lstStyle/>
-          <a:p>
-            <a:pPr>
-              <a:spcAft>
-                <a:spcPts val="1000"/>
-              </a:spcAft>
-              <a:defRPr sz="1400">
-                <a:solidFill>
-                  <a:srgbClr val="002060"/>
-                </a:solidFill>
-                <a:latin typeface="Segoe UI"/>
-              </a:defRPr>
-            </a:pPr>
-            <a:r>
-              <a:t>Current state: 4,381 Copilot users but only 4% trying Agents, 87% infrequent usage, 203K unlicensed actions</a:t>
-            </a:r>
-          </a:p>
-          <a:p>
-            <a:pPr>
-              <a:spcAft>
-                <a:spcPts val="1000"/>
-              </a:spcAft>
-              <a:defRPr sz="1400">
-                <a:solidFill>
-                  <a:srgbClr val="002060"/>
-                </a:solidFill>
-                <a:latin typeface="Segoe UI"/>
-              </a:defRPr>
-            </a:pPr>
-            <a:r>
-              <a:t>Three priorities: Agent awareness blitz, habit formation program, strategic license upgrades (Finance/IT/Legal)</a:t>
-            </a:r>
-          </a:p>
-          <a:p>
-            <a:pPr>
-              <a:spcAft>
-                <a:spcPts val="1000"/>
-              </a:spcAft>
-              <a:defRPr sz="1400">
-                <a:solidFill>
-                  <a:srgbClr val="002060"/>
-                </a:solidFill>
-                <a:latin typeface="Segoe UI"/>
-              </a:defRPr>
-            </a:pPr>
-            <a:r>
-              <a:t>Success metrics: Track Agent penetration, daily user %, and license conversion rate monthly through Q2 2026</a:t>
-            </a:r>
-          </a:p>
-        </p:txBody>
-      </p:sp>
-    </p:spTree>
-  </p:cSld>
-  <p:clrMapOvr>
-    <a:masterClrMapping/>
-  </p:clrMapOvr>
-</p:sld>
-</file>
-
-<file path=ppt/slides/slide2.xml><?xml version="1.0" encoding="utf-8"?>
-<p:sld xmlns:a="http://schemas.openxmlformats.org/drawingml/2006/main" xmlns:p="http://schemas.openxmlformats.org/presentationml/2006/main" xmlns:r="http://schemas.openxmlformats.org/officeDocument/2006/relationships">
-  <p:cSld>
-    <p:bg>
-      <p:bgPr>
-        <a:solidFill>
-          <a:srgbClr val="FFFFFF"/>
-        </a:solidFill>
-        <a:effectLst/>
-      </p:bgPr>
-    </p:bg>
-    <p:spTree>
-      <p:nvGrpSpPr>
-        <p:cNvPr id="1" name=""/>
-        <p:cNvGrpSpPr/>
-        <p:nvPr/>
-      </p:nvGrpSpPr>
-      <p:grpSpPr/>
-      <p:sp>
-        <p:nvSpPr>
-          <p:cNvPr id="2" name="TextBox 1"/>
-          <p:cNvSpPr txBox="1"/>
-          <p:nvPr/>
-        </p:nvSpPr>
-        <p:spPr>
-          <a:xfrm>
-            <a:off x="457200" y="457200"/>
-            <a:ext cx="10972800" cy="640080"/>
-          </a:xfrm>
-          <a:prstGeom prst="rect">
-            <a:avLst/>
-          </a:prstGeom>
-          <a:noFill/>
-        </p:spPr>
-        <p:txBody>
-          <a:bodyPr wrap="square">
-            <a:spAutoFit/>
-          </a:bodyPr>
-          <a:lstStyle/>
-          <a:p>
-            <a:pPr>
-              <a:defRPr sz="2400" b="1">
-                <a:solidFill>
-                  <a:srgbClr val="0072C6"/>
-                </a:solidFill>
-                <a:latin typeface="Segoe UI"/>
-              </a:defRPr>
-            </a:pPr>
-            <a:r>
-              <a:t>The Strategic Imperative: Three Critical Actions Required</a:t>
-            </a:r>
-          </a:p>
-        </p:txBody>
-      </p:sp>
-      <p:sp>
-        <p:nvSpPr>
-          <p:cNvPr id="3" name="TextBox 2"/>
-          <p:cNvSpPr txBox="1"/>
-          <p:nvPr/>
-        </p:nvSpPr>
-        <p:spPr>
-          <a:xfrm>
-            <a:off x="457200" y="1371600"/>
-            <a:ext cx="10972800" cy="3657600"/>
-          </a:xfrm>
-          <a:prstGeom prst="rect">
-            <a:avLst/>
-          </a:prstGeom>
-          <a:noFill/>
-        </p:spPr>
-        <p:txBody>
-          <a:bodyPr wrap="square">
-            <a:spAutoFit/>
-          </a:bodyPr>
-          <a:lstStyle/>
-          <a:p>
-            <a:pPr>
-              <a:spcAft>
-                <a:spcPts val="1000"/>
-              </a:spcAft>
-              <a:defRPr sz="1400">
-                <a:solidFill>
-                  <a:srgbClr val="002060"/>
-                </a:solidFill>
-                <a:latin typeface="Segoe UI"/>
-              </a:defRPr>
-            </a:pPr>
-            <a:r>
-              <a:t>Agent adoption stalled at 4% penetration despite 4,400+ Copilot users - untapped productivity potential</a:t>
-            </a:r>
-          </a:p>
-          <a:p>
-            <a:pPr>
-              <a:spcAft>
-                <a:spcPts val="1000"/>
-              </a:spcAft>
-              <a:defRPr sz="1400">
-                <a:solidFill>
-                  <a:srgbClr val="002060"/>
-                </a:solidFill>
-                <a:latin typeface="Segoe UI"/>
-              </a:defRPr>
-            </a:pPr>
-            <a:r>
-              <a:t>87% of Agent users stuck in infrequent usage pattern (1-5 days/month) - habit formation crisis</a:t>
-            </a:r>
-          </a:p>
-          <a:p>
-            <a:pPr>
-              <a:spcAft>
-                <a:spcPts val="1000"/>
-              </a:spcAft>
-              <a:defRPr sz="1400">
-                <a:solidFill>
-                  <a:srgbClr val="002060"/>
-                </a:solidFill>
-                <a:latin typeface="Segoe UI"/>
-              </a:defRPr>
-            </a:pPr>
-            <a:r>
-              <a:t>Finance, IT, and Legal show highest unlicensed engagement - immediate license upgrade candidates</a:t>
-            </a:r>
-          </a:p>
-        </p:txBody>
-      </p:sp>
-    </p:spTree>
-  </p:cSld>
-  <p:clrMapOvr>
-    <a:masterClrMapping/>
-  </p:clrMapOvr>
-</p:sld>
-</file>
-
-<file path=ppt/slides/slide3.xml><?xml version="1.0" encoding="utf-8"?>
-<p:sld xmlns:a="http://schemas.openxmlformats.org/drawingml/2006/main" xmlns:p="http://schemas.openxmlformats.org/presentationml/2006/main" xmlns:r="http://schemas.openxmlformats.org/officeDocument/2006/relationships">
-  <p:cSld>
-    <p:bg>
-      <p:bgPr>
-        <a:solidFill>
-          <a:srgbClr val="F5EFE7"/>
-        </a:solidFill>
-        <a:effectLst/>
-      </p:bgPr>
-    </p:bg>
-    <p:spTree>
-      <p:nvGrpSpPr>
-        <p:cNvPr id="1" name=""/>
-        <p:cNvGrpSpPr/>
-        <p:nvPr/>
-      </p:nvGrpSpPr>
-      <p:grpSpPr/>
-      <p:sp>
-        <p:nvSpPr>
-          <p:cNvPr id="2" name="TextBox 1"/>
-          <p:cNvSpPr txBox="1"/>
-          <p:nvPr/>
-        </p:nvSpPr>
-        <p:spPr>
-          <a:xfrm>
-            <a:off x="457200" y="3200400"/>
-            <a:ext cx="10972800" cy="914400"/>
-          </a:xfrm>
-          <a:prstGeom prst="rect">
-            <a:avLst/>
-          </a:prstGeom>
-          <a:noFill/>
-        </p:spPr>
-        <p:txBody>
-          <a:bodyPr wrap="none">
-            <a:spAutoFit/>
-          </a:bodyPr>
-          <a:lstStyle/>
-          <a:p>
-            <a:pPr algn="ctr">
-              <a:defRPr sz="3600" b="1">
-                <a:solidFill>
-                  <a:srgbClr val="002060"/>
-                </a:solidFill>
-                <a:latin typeface="Segoe UI"/>
-              </a:defRPr>
-            </a:pPr>
-            <a:r>
-              <a:t>The Opportunity Gap</a:t>
-            </a:r>
-          </a:p>
-        </p:txBody>
-      </p:sp>
-    </p:spTree>
-  </p:cSld>
-  <p:clrMapOvr>
-    <a:masterClrMapping/>
-  </p:clrMapOvr>
-</p:sld>
-</file>
-
-<file path=ppt/slides/slide4.xml><?xml version="1.0" encoding="utf-8"?>
-<p:sld xmlns:a="http://schemas.openxmlformats.org/drawingml/2006/main" xmlns:p="http://schemas.openxmlformats.org/presentationml/2006/main" xmlns:r="http://schemas.openxmlformats.org/officeDocument/2006/relationships">
-  <p:cSld>
-    <p:bg>
-      <p:bgPr>
-        <a:solidFill>
-          <a:srgbClr val="F5EFE7"/>
-        </a:solidFill>
-        <a:effectLst/>
-      </p:bgPr>
-    </p:bg>
-    <p:spTree>
-      <p:nvGrpSpPr>
-        <p:cNvPr id="1" name=""/>
-        <p:cNvGrpSpPr/>
-        <p:nvPr/>
-      </p:nvGrpSpPr>
-      <p:grpSpPr/>
-      <p:sp>
-        <p:nvSpPr>
-          <p:cNvPr id="2" name="TextBox 1"/>
-          <p:cNvSpPr txBox="1"/>
-          <p:nvPr/>
-        </p:nvSpPr>
-        <p:spPr>
-          <a:xfrm>
-            <a:off x="457200" y="457200"/>
-            <a:ext cx="10972800" cy="640080"/>
-          </a:xfrm>
-          <a:prstGeom prst="rect">
-            <a:avLst/>
-          </a:prstGeom>
-          <a:noFill/>
-        </p:spPr>
-        <p:txBody>
-          <a:bodyPr wrap="square">
-            <a:spAutoFit/>
-          </a:bodyPr>
-          <a:lstStyle/>
-          <a:p>
-            <a:pPr>
-              <a:defRPr sz="2400" b="1">
-                <a:solidFill>
-                  <a:srgbClr val="0072C6"/>
-                </a:solidFill>
-                <a:latin typeface="Segoe UI"/>
-              </a:defRPr>
-            </a:pPr>
-            <a:r>
-              <a:t>Strong Copilot adoption masks critical Agent engagement gap requiring intervention</a:t>
-            </a:r>
-          </a:p>
-        </p:txBody>
-      </p:sp>
-      <p:pic>
-        <p:nvPicPr>
-          <p:cNvPr id="3" name="Picture 2" descr="temp_copilot_trends.png"/>
-          <p:cNvPicPr>
-            <a:picLocks noChangeAspect="1"/>
-          </p:cNvPicPr>
-          <p:nvPr/>
-        </p:nvPicPr>
-        <p:blipFill>
-          <a:blip r:embed="rId2"/>
-          <a:stretch>
-            <a:fillRect/>
-          </a:stretch>
-        </p:blipFill>
-        <p:spPr>
-          <a:xfrm>
-            <a:off x="457200" y="1371600"/>
-            <a:ext cx="6858000" cy="3911203"/>
-          </a:xfrm>
-          <a:prstGeom prst="rect">
-            <a:avLst/>
-          </a:prstGeom>
-          <a:ln w="25400">
-            <a:solidFill>
-              <a:srgbClr val="0072C6"/>
-            </a:solidFill>
-          </a:ln>
-        </p:spPr>
-      </p:pic>
-      <p:sp>
-        <p:nvSpPr>
-          <p:cNvPr id="4" name="TextBox 3"/>
-          <p:cNvSpPr txBox="1"/>
-          <p:nvPr/>
-        </p:nvSpPr>
-        <p:spPr>
-          <a:xfrm>
-            <a:off x="7589520" y="1371600"/>
-            <a:ext cx="4142232" cy="4572000"/>
-          </a:xfrm>
-          <a:prstGeom prst="rect">
-            <a:avLst/>
-          </a:prstGeom>
-          <a:noFill/>
-        </p:spPr>
-        <p:txBody>
-          <a:bodyPr wrap="square" anchor="t">
-            <a:spAutoFit/>
-          </a:bodyPr>
-          <a:lstStyle/>
-          <a:p>
-            <a:pPr>
-              <a:spcAft>
-                <a:spcPts val="1200"/>
-              </a:spcAft>
-              <a:defRPr sz="1400">
-                <a:solidFill>
-                  <a:srgbClr val="002060"/>
-                </a:solidFill>
-                <a:latin typeface="Segoe UI"/>
-              </a:defRPr>
-            </a:pPr>
-            <a:r>
-              <a:t>4,381 active Copilot users (2,585 unlicensed + 1,616 M365 + 180 agents) demonstrate platform reach</a:t>
-            </a:r>
-          </a:p>
-          <a:p>
-            <a:pPr>
-              <a:spcAft>
-                <a:spcPts val="1200"/>
-              </a:spcAft>
-              <a:defRPr sz="1400">
-                <a:solidFill>
-                  <a:srgbClr val="002060"/>
-                </a:solidFill>
-                <a:latin typeface="Segoe UI"/>
-              </a:defRPr>
-            </a:pPr>
-            <a:r>
-              <a:t>Agent users show 3x growth trajectory (7 to 21 actions/month Mar-Jun) validating capability value</a:t>
-            </a:r>
-          </a:p>
-          <a:p>
-            <a:pPr>
-              <a:spcAft>
-                <a:spcPts val="1200"/>
-              </a:spcAft>
-              <a:defRPr sz="1400">
-                <a:solidFill>
-                  <a:srgbClr val="002060"/>
-                </a:solidFill>
-                <a:latin typeface="Segoe UI"/>
-              </a:defRPr>
-            </a:pPr>
-            <a:r>
-              <a:t>Legal Operations emerged as power user segment (35 actions/user, 6+ active days) - replication opportunity</a:t>
-            </a:r>
-          </a:p>
-        </p:txBody>
-      </p:sp>
-    </p:spTree>
-  </p:cSld>
-  <p:clrMapOvr>
-    <a:masterClrMapping/>
-  </p:clrMapOvr>
-</p:sld>
-</file>
-
-<file path=ppt/slides/slide5.xml><?xml version="1.0" encoding="utf-8"?>
-<p:sld xmlns:a="http://schemas.openxmlformats.org/drawingml/2006/main" xmlns:p="http://schemas.openxmlformats.org/presentationml/2006/main" xmlns:r="http://schemas.openxmlformats.org/officeDocument/2006/relationships">
-  <p:cSld>
-    <p:bg>
-      <p:bgPr>
-        <a:solidFill>
-          <a:srgbClr val="F5EFE7"/>
-        </a:solidFill>
-        <a:effectLst/>
-      </p:bgPr>
-    </p:bg>
-    <p:spTree>
-      <p:nvGrpSpPr>
-        <p:cNvPr id="1" name=""/>
-        <p:cNvGrpSpPr/>
-        <p:nvPr/>
-      </p:nvGrpSpPr>
-      <p:grpSpPr/>
-      <p:sp>
-        <p:nvSpPr>
-          <p:cNvPr id="2" name="TextBox 1"/>
-          <p:cNvSpPr txBox="1"/>
-          <p:nvPr/>
-        </p:nvSpPr>
-        <p:spPr>
-          <a:xfrm>
-            <a:off x="457200" y="457200"/>
-            <a:ext cx="10972800" cy="640080"/>
-          </a:xfrm>
-          <a:prstGeom prst="rect">
-            <a:avLst/>
-          </a:prstGeom>
-          <a:noFill/>
-        </p:spPr>
-        <p:txBody>
-          <a:bodyPr wrap="square">
-            <a:spAutoFit/>
-          </a:bodyPr>
-          <a:lstStyle/>
-          <a:p>
-            <a:pPr>
-              <a:defRPr sz="2400" b="1">
-                <a:solidFill>
-                  <a:srgbClr val="0072C6"/>
-                </a:solidFill>
-                <a:latin typeface="Segoe UI"/>
-              </a:defRPr>
-            </a:pPr>
-            <a:r>
-              <a:t>96% of Copilot users have never tried Agents - massive awareness and adoption gap</a:t>
-            </a:r>
-          </a:p>
-        </p:txBody>
-      </p:sp>
-      <p:pic>
-        <p:nvPicPr>
-          <p:cNvPr id="3" name="Picture 2" descr="temp_copilot_leaderboard.png"/>
-          <p:cNvPicPr>
-            <a:picLocks noChangeAspect="1"/>
-          </p:cNvPicPr>
-          <p:nvPr/>
-        </p:nvPicPr>
-        <p:blipFill>
-          <a:blip r:embed="rId2"/>
-          <a:stretch>
-            <a:fillRect/>
-          </a:stretch>
-        </p:blipFill>
-        <p:spPr>
-          <a:xfrm>
-            <a:off x="457200" y="1371600"/>
-            <a:ext cx="6858000" cy="3911203"/>
-          </a:xfrm>
-          <a:prstGeom prst="rect">
-            <a:avLst/>
-          </a:prstGeom>
-          <a:ln w="25400">
-            <a:solidFill>
-              <a:srgbClr val="0072C6"/>
-            </a:solidFill>
-          </a:ln>
-        </p:spPr>
-      </p:pic>
-      <p:sp>
-        <p:nvSpPr>
-          <p:cNvPr id="4" name="TextBox 3"/>
-          <p:cNvSpPr txBox="1"/>
-          <p:nvPr/>
-        </p:nvSpPr>
-        <p:spPr>
-          <a:xfrm>
-            <a:off x="7589520" y="1371600"/>
-            <a:ext cx="4142232" cy="4572000"/>
-          </a:xfrm>
-          <a:prstGeom prst="rect">
-            <a:avLst/>
-          </a:prstGeom>
-          <a:noFill/>
-        </p:spPr>
-        <p:txBody>
-          <a:bodyPr wrap="square" anchor="t">
-            <a:spAutoFit/>
-          </a:bodyPr>
-          <a:lstStyle/>
-          <a:p>
-            <a:pPr>
-              <a:spcAft>
-                <a:spcPts val="1200"/>
-              </a:spcAft>
-              <a:defRPr sz="1400">
-                <a:solidFill>
-                  <a:srgbClr val="002060"/>
-                </a:solidFill>
-                <a:latin typeface="Segoe UI"/>
-              </a:defRPr>
-            </a:pPr>
-            <a:r>
-              <a:t>Only 4% of 4,200+ Copilot users have adopted Agents across both licensed and unlicensed segments</a:t>
-            </a:r>
-          </a:p>
-          <a:p>
-            <a:pPr>
-              <a:spcAft>
-                <a:spcPts val="1200"/>
-              </a:spcAft>
-              <a:defRPr sz="1400">
-                <a:solidFill>
-                  <a:srgbClr val="002060"/>
-                </a:solidFill>
-                <a:latin typeface="Segoe UI"/>
-              </a:defRPr>
-            </a:pPr>
-            <a:r>
-              <a:t>Finance shows 7% agent adoption (highest) at 109 prompts/user - proof point for targeted enablement</a:t>
-            </a:r>
-          </a:p>
-          <a:p>
-            <a:pPr>
-              <a:spcAft>
-                <a:spcPts val="1200"/>
-              </a:spcAft>
-              <a:defRPr sz="1400">
-                <a:solidFill>
-                  <a:srgbClr val="002060"/>
-                </a:solidFill>
-                <a:latin typeface="Segoe UI"/>
-              </a:defRPr>
-            </a:pPr>
-            <a:r>
-              <a:t>Gap represents 4,000+ users unaware of or unmotivated to try agentic capabilities - immediate action required</a:t>
-            </a:r>
-          </a:p>
-        </p:txBody>
-      </p:sp>
-    </p:spTree>
-  </p:cSld>
-  <p:clrMapOvr>
-    <a:masterClrMapping/>
-  </p:clrMapOvr>
-</p:sld>
-</file>
-
-<file path=ppt/slides/slide6.xml><?xml version="1.0" encoding="utf-8"?>
-<p:sld xmlns:a="http://schemas.openxmlformats.org/drawingml/2006/main" xmlns:p="http://schemas.openxmlformats.org/presentationml/2006/main" xmlns:r="http://schemas.openxmlformats.org/officeDocument/2006/relationships">
-  <p:cSld>
-    <p:bg>
-      <p:bgPr>
-        <a:solidFill>
-          <a:srgbClr val="F5EFE7"/>
-        </a:solidFill>
-        <a:effectLst/>
-      </p:bgPr>
-    </p:bg>
-    <p:spTree>
-      <p:nvGrpSpPr>
-        <p:cNvPr id="1" name=""/>
-        <p:cNvGrpSpPr/>
-        <p:nvPr/>
-      </p:nvGrpSpPr>
-      <p:grpSpPr/>
-      <p:sp>
-        <p:nvSpPr>
-          <p:cNvPr id="2" name="TextBox 1"/>
-          <p:cNvSpPr txBox="1"/>
-          <p:nvPr/>
-        </p:nvSpPr>
-        <p:spPr>
-          <a:xfrm>
-            <a:off x="457200" y="457200"/>
-            <a:ext cx="10972800" cy="640080"/>
-          </a:xfrm>
-          <a:prstGeom prst="rect">
-            <a:avLst/>
-          </a:prstGeom>
-          <a:noFill/>
-        </p:spPr>
-        <p:txBody>
-          <a:bodyPr wrap="square">
-            <a:spAutoFit/>
-          </a:bodyPr>
-          <a:lstStyle/>
-          <a:p>
-            <a:pPr>
-              <a:defRPr sz="2400" b="1">
-                <a:solidFill>
-                  <a:srgbClr val="0072C6"/>
-                </a:solidFill>
-                <a:latin typeface="Segoe UI"/>
-              </a:defRPr>
-            </a:pPr>
-            <a:r>
-              <a:t>87% of Agent users remain infrequent - usage has not embedded into workflows</a:t>
-            </a:r>
-          </a:p>
-        </p:txBody>
-      </p:sp>
-      <p:pic>
-        <p:nvPicPr>
-          <p:cNvPr id="3" name="Picture 2" descr="temp_agents_habits.png"/>
-          <p:cNvPicPr>
-            <a:picLocks noChangeAspect="1"/>
-          </p:cNvPicPr>
-          <p:nvPr/>
-        </p:nvPicPr>
-        <p:blipFill>
-          <a:blip r:embed="rId2"/>
-          <a:stretch>
-            <a:fillRect/>
-          </a:stretch>
-        </p:blipFill>
-        <p:spPr>
-          <a:xfrm>
-            <a:off x="457200" y="1371600"/>
-            <a:ext cx="6858000" cy="3911203"/>
-          </a:xfrm>
-          <a:prstGeom prst="rect">
-            <a:avLst/>
-          </a:prstGeom>
-          <a:ln w="25400">
-            <a:solidFill>
-              <a:srgbClr val="0072C6"/>
-            </a:solidFill>
-          </a:ln>
-        </p:spPr>
-      </p:pic>
-      <p:sp>
-        <p:nvSpPr>
-          <p:cNvPr id="4" name="TextBox 3"/>
-          <p:cNvSpPr txBox="1"/>
-          <p:nvPr/>
-        </p:nvSpPr>
-        <p:spPr>
-          <a:xfrm>
-            <a:off x="7589520" y="1371600"/>
-            <a:ext cx="4142232" cy="4572000"/>
-          </a:xfrm>
-          <a:prstGeom prst="rect">
-            <a:avLst/>
-          </a:prstGeom>
-          <a:noFill/>
-        </p:spPr>
-        <p:txBody>
-          <a:bodyPr wrap="square" anchor="t">
-            <a:spAutoFit/>
-          </a:bodyPr>
-          <a:lstStyle/>
-          <a:p>
-            <a:pPr>
-              <a:spcAft>
-                <a:spcPts val="1200"/>
-              </a:spcAft>
-              <a:defRPr sz="1400">
-                <a:solidFill>
-                  <a:srgbClr val="002060"/>
-                </a:solidFill>
-                <a:latin typeface="Segoe UI"/>
-              </a:defRPr>
-            </a:pPr>
-            <a:r>
-              <a:t>Zero daily users (20+ days/month) and only 3% frequent users signals fundamental adoption challenge</a:t>
-            </a:r>
-          </a:p>
-          <a:p>
-            <a:pPr>
-              <a:spcAft>
-                <a:spcPts val="1200"/>
-              </a:spcAft>
-              <a:defRPr sz="1400">
-                <a:solidFill>
-                  <a:srgbClr val="002060"/>
-                </a:solidFill>
-                <a:latin typeface="Segoe UI"/>
-              </a:defRPr>
-            </a:pPr>
-            <a:r>
-              <a:t>Finance and Legal show highest engagement (16 actions/user) yet still infrequent - onboarding gap</a:t>
-            </a:r>
-          </a:p>
-          <a:p>
-            <a:pPr>
-              <a:spcAft>
-                <a:spcPts val="1200"/>
-              </a:spcAft>
-              <a:defRPr sz="1400">
-                <a:solidFill>
-                  <a:srgbClr val="002060"/>
-                </a:solidFill>
-                <a:latin typeface="Segoe UI"/>
-              </a:defRPr>
-            </a:pPr>
-            <a:r>
-              <a:t>Pattern suggests discovery phase stuck - users try once but fail to integrate into daily workflows</a:t>
-            </a:r>
-          </a:p>
-        </p:txBody>
-      </p:sp>
-    </p:spTree>
-  </p:cSld>
-  <p:clrMapOvr>
-    <a:masterClrMapping/>
-  </p:clrMapOvr>
-</p:sld>
-</file>
-
-<file path=ppt/slides/slide7.xml><?xml version="1.0" encoding="utf-8"?>
-<p:sld xmlns:a="http://schemas.openxmlformats.org/drawingml/2006/main" xmlns:p="http://schemas.openxmlformats.org/presentationml/2006/main" xmlns:r="http://schemas.openxmlformats.org/officeDocument/2006/relationships">
-  <p:cSld>
-    <p:bg>
-      <p:bgPr>
-        <a:solidFill>
-          <a:srgbClr val="F5EFE7"/>
-        </a:solidFill>
-        <a:effectLst/>
-      </p:bgPr>
-    </p:bg>
-    <p:spTree>
-      <p:nvGrpSpPr>
-        <p:cNvPr id="1" name=""/>
-        <p:cNvGrpSpPr/>
-        <p:nvPr/>
-      </p:nvGrpSpPr>
-      <p:grpSpPr/>
-      <p:sp>
-        <p:nvSpPr>
-          <p:cNvPr id="2" name="TextBox 1"/>
-          <p:cNvSpPr txBox="1"/>
-          <p:nvPr/>
-        </p:nvSpPr>
-        <p:spPr>
-          <a:xfrm>
-            <a:off x="457200" y="457200"/>
-            <a:ext cx="10972800" cy="640080"/>
-          </a:xfrm>
-          <a:prstGeom prst="rect">
-            <a:avLst/>
-          </a:prstGeom>
-          <a:noFill/>
-        </p:spPr>
-        <p:txBody>
-          <a:bodyPr wrap="square">
-            <a:spAutoFit/>
-          </a:bodyPr>
-          <a:lstStyle/>
-          <a:p>
-            <a:pPr>
-              <a:defRPr sz="2400" b="1">
-                <a:solidFill>
-                  <a:srgbClr val="0072C6"/>
-                </a:solidFill>
-                <a:latin typeface="Segoe UI"/>
-              </a:defRPr>
-            </a:pPr>
-            <a:r>
-              <a:t>Visual Creator captures 99 of 180 users - single use case driving all adoption</a:t>
-            </a:r>
-          </a:p>
-        </p:txBody>
-      </p:sp>
-      <p:pic>
-        <p:nvPicPr>
-          <p:cNvPr id="3" name="Picture 2" descr="temp_agents_habits.png"/>
-          <p:cNvPicPr>
-            <a:picLocks noChangeAspect="1"/>
-          </p:cNvPicPr>
-          <p:nvPr/>
-        </p:nvPicPr>
-        <p:blipFill>
-          <a:blip r:embed="rId2"/>
-          <a:stretch>
-            <a:fillRect/>
-          </a:stretch>
-        </p:blipFill>
-        <p:spPr>
-          <a:xfrm>
-            <a:off x="457200" y="1371600"/>
-            <a:ext cx="6858000" cy="3911203"/>
-          </a:xfrm>
-          <a:prstGeom prst="rect">
-            <a:avLst/>
-          </a:prstGeom>
-          <a:ln w="25400">
-            <a:solidFill>
-              <a:srgbClr val="0072C6"/>
-            </a:solidFill>
-          </a:ln>
-        </p:spPr>
-      </p:pic>
-      <p:sp>
-        <p:nvSpPr>
-          <p:cNvPr id="4" name="TextBox 3"/>
-          <p:cNvSpPr txBox="1"/>
-          <p:nvPr/>
-        </p:nvSpPr>
-        <p:spPr>
-          <a:xfrm>
-            <a:off x="7589520" y="1371600"/>
-            <a:ext cx="4142232" cy="4572000"/>
-          </a:xfrm>
-          <a:prstGeom prst="rect">
-            <a:avLst/>
-          </a:prstGeom>
-          <a:noFill/>
-        </p:spPr>
-        <p:txBody>
-          <a:bodyPr wrap="square" anchor="t">
-            <a:spAutoFit/>
-          </a:bodyPr>
-          <a:lstStyle/>
-          <a:p>
-            <a:pPr>
-              <a:spcAft>
-                <a:spcPts val="1200"/>
-              </a:spcAft>
-              <a:defRPr sz="1400">
-                <a:solidFill>
-                  <a:srgbClr val="002060"/>
-                </a:solidFill>
-                <a:latin typeface="Segoe UI"/>
-              </a:defRPr>
-            </a:pPr>
-            <a:r>
-              <a:t>55% of Agent users concentrated in Visual Creator (656 actions) while other agents see minimal usage</a:t>
-            </a:r>
-          </a:p>
-          <a:p>
-            <a:pPr>
-              <a:spcAft>
-                <a:spcPts val="1200"/>
-              </a:spcAft>
-              <a:defRPr sz="1400">
-                <a:solidFill>
-                  <a:srgbClr val="002060"/>
-                </a:solidFill>
-                <a:latin typeface="Segoe UI"/>
-              </a:defRPr>
-            </a:pPr>
-            <a:r>
-              <a:t>IT Service Agent (9 users, 323 actions) shows depth potential with high actions per engaged user</a:t>
-            </a:r>
-          </a:p>
-          <a:p>
-            <a:pPr>
-              <a:spcAft>
-                <a:spcPts val="1200"/>
-              </a:spcAft>
-              <a:defRPr sz="1400">
-                <a:solidFill>
-                  <a:srgbClr val="002060"/>
-                </a:solidFill>
-                <a:latin typeface="Segoe UI"/>
-              </a:defRPr>
-            </a:pPr>
-            <a:r>
-              <a:t>Concentration risk: Agent value proposition currently perceived as single-purpose vs. platform capability</a:t>
-            </a:r>
-          </a:p>
-        </p:txBody>
-      </p:sp>
-    </p:spTree>
-  </p:cSld>
-  <p:clrMapOvr>
-    <a:masterClrMapping/>
-  </p:clrMapOvr>
-</p:sld>
-</file>
-
-<file path=ppt/slides/slide8.xml><?xml version="1.0" encoding="utf-8"?>
-<p:sld xmlns:a="http://schemas.openxmlformats.org/drawingml/2006/main" xmlns:p="http://schemas.openxmlformats.org/presentationml/2006/main" xmlns:r="http://schemas.openxmlformats.org/officeDocument/2006/relationships">
-  <p:cSld>
-    <p:bg>
-      <p:bgPr>
-        <a:solidFill>
-          <a:srgbClr val="F5EFE7"/>
-        </a:solidFill>
-        <a:effectLst/>
-      </p:bgPr>
-    </p:bg>
-    <p:spTree>
-      <p:nvGrpSpPr>
-        <p:cNvPr id="1" name=""/>
-        <p:cNvGrpSpPr/>
-        <p:nvPr/>
-      </p:nvGrpSpPr>
-      <p:grpSpPr/>
-      <p:sp>
-        <p:nvSpPr>
-          <p:cNvPr id="2" name="TextBox 1"/>
-          <p:cNvSpPr txBox="1"/>
-          <p:nvPr/>
-        </p:nvSpPr>
-        <p:spPr>
-          <a:xfrm>
-            <a:off x="457200" y="3200400"/>
-            <a:ext cx="10972800" cy="914400"/>
-          </a:xfrm>
-          <a:prstGeom prst="rect">
-            <a:avLst/>
-          </a:prstGeom>
-          <a:noFill/>
-        </p:spPr>
-        <p:txBody>
-          <a:bodyPr wrap="none">
-            <a:spAutoFit/>
-          </a:bodyPr>
-          <a:lstStyle/>
-          <a:p>
-            <a:pPr algn="ctr">
-              <a:defRPr sz="3600" b="1">
-                <a:solidFill>
-                  <a:srgbClr val="002060"/>
-                </a:solidFill>
-                <a:latin typeface="Segoe UI"/>
-              </a:defRPr>
-            </a:pPr>
-            <a:r>
-              <a:t>License Optimization</a:t>
-            </a:r>
-          </a:p>
-        </p:txBody>
-      </p:sp>
-    </p:spTree>
-  </p:cSld>
-  <p:clrMapOvr>
-    <a:masterClrMapping/>
-  </p:clrMapOvr>
-</p:sld>
-</file>
-
-<file path=ppt/slides/slide9.xml><?xml version="1.0" encoding="utf-8"?>
-<p:sld xmlns:a="http://schemas.openxmlformats.org/drawingml/2006/main" xmlns:p="http://schemas.openxmlformats.org/presentationml/2006/main" xmlns:r="http://schemas.openxmlformats.org/officeDocument/2006/relationships">
-  <p:cSld>
-    <p:bg>
-      <p:bgPr>
-        <a:solidFill>
-          <a:srgbClr val="F5EFE7"/>
-        </a:solidFill>
-        <a:effectLst/>
-      </p:bgPr>
-    </p:bg>
-    <p:spTree>
-      <p:nvGrpSpPr>
-        <p:cNvPr id="1" name=""/>
-        <p:cNvGrpSpPr/>
-        <p:nvPr/>
-      </p:nvGrpSpPr>
-      <p:grpSpPr/>
-      <p:sp>
-        <p:nvSpPr>
-          <p:cNvPr id="2" name="TextBox 1"/>
-          <p:cNvSpPr txBox="1"/>
-          <p:nvPr/>
-        </p:nvSpPr>
-        <p:spPr>
-          <a:xfrm>
-            <a:off x="457200" y="457200"/>
-            <a:ext cx="10972800" cy="640080"/>
-          </a:xfrm>
-          <a:prstGeom prst="rect">
-            <a:avLst/>
-          </a:prstGeom>
-          <a:noFill/>
-        </p:spPr>
-        <p:txBody>
-          <a:bodyPr wrap="square">
-            <a:spAutoFit/>
-          </a:bodyPr>
-          <a:lstStyle/>
-          <a:p>
-            <a:pPr>
-              <a:defRPr sz="2400" b="1">
-                <a:solidFill>
-                  <a:srgbClr val="0072C6"/>
-                </a:solidFill>
-                <a:latin typeface="Segoe UI"/>
-              </a:defRPr>
-            </a:pPr>
-            <a:r>
-              <a:t>Finance, IT, and Legal unlicensed power users represent immediate ROI upgrade targets</a:t>
-            </a:r>
-          </a:p>
-        </p:txBody>
-      </p:sp>
-      <p:pic>
-        <p:nvPicPr>
-          <p:cNvPr id="3" name="Picture 2" descr="temp_license.png"/>
-          <p:cNvPicPr>
-            <a:picLocks noChangeAspect="1"/>
-          </p:cNvPicPr>
-          <p:nvPr/>
-        </p:nvPicPr>
-        <p:blipFill>
-          <a:blip r:embed="rId2"/>
-          <a:stretch>
-            <a:fillRect/>
-          </a:stretch>
-        </p:blipFill>
-        <p:spPr>
-          <a:xfrm>
-            <a:off x="457200" y="1371600"/>
-            <a:ext cx="6858000" cy="3911203"/>
-          </a:xfrm>
-          <a:prstGeom prst="rect">
-            <a:avLst/>
-          </a:prstGeom>
-          <a:ln w="25400">
-            <a:solidFill>
-              <a:srgbClr val="0072C6"/>
-            </a:solidFill>
-          </a:ln>
-        </p:spPr>
-      </p:pic>
-      <p:sp>
-        <p:nvSpPr>
-          <p:cNvPr id="4" name="TextBox 3"/>
-          <p:cNvSpPr txBox="1"/>
-          <p:nvPr/>
-        </p:nvSpPr>
-        <p:spPr>
-          <a:xfrm>
-            <a:off x="7589520" y="1371600"/>
-            <a:ext cx="4142232" cy="4572000"/>
-          </a:xfrm>
-          <a:prstGeom prst="rect">
-            <a:avLst/>
-          </a:prstGeom>
-          <a:noFill/>
-        </p:spPr>
-        <p:txBody>
-          <a:bodyPr wrap="square" anchor="t">
-            <a:spAutoFit/>
-          </a:bodyPr>
-          <a:lstStyle/>
-          <a:p>
-            <a:pPr>
-              <a:spcAft>
-                <a:spcPts val="1200"/>
-              </a:spcAft>
-              <a:defRPr sz="1400">
-                <a:solidFill>
-                  <a:srgbClr val="002060"/>
-                </a:solidFill>
-                <a:latin typeface="Segoe UI"/>
-              </a:defRPr>
-            </a:pPr>
-            <a:r>
-              <a:t>Finance (38 prompts/user), IT (24 prompts), Legal (29 prompts) show sustained high usage in unlicensed tier</a:t>
-            </a:r>
-          </a:p>
-          <a:p>
-            <a:pPr>
-              <a:spcAft>
-                <a:spcPts val="1200"/>
-              </a:spcAft>
-              <a:defRPr sz="1400">
-                <a:solidFill>
-                  <a:srgbClr val="002060"/>
-                </a:solidFill>
-                <a:latin typeface="Segoe UI"/>
-              </a:defRPr>
-            </a:pPr>
-            <a:r>
-              <a:t>Priority matrix identifies these departments in high-value quadrant (usage + consistency above threshold)</a:t>
-            </a:r>
-          </a:p>
-          <a:p>
-            <a:pPr>
-              <a:spcAft>
-                <a:spcPts val="1200"/>
-              </a:spcAft>
-              <a:defRPr sz="1400">
-                <a:solidFill>
-                  <a:srgbClr val="002060"/>
-                </a:solidFill>
-                <a:latin typeface="Segoe UI"/>
-              </a:defRPr>
-            </a:pPr>
-            <a:r>
-              <a:t>Converting these 324 + 291 + 314 = 929 users captures proven high-engagement audience for license revenue</a:t>
             </a:r>
           </a:p>
         </p:txBody>
@@ -5465,4 +5733,325 @@
   </a:objectDefaults>
   <a:extraClrSchemeLst/>
 </a:theme>
+</file>
+
+<file path=ppt/theme/theme2.xml><?xml version="1.0" encoding="utf-8"?>
+<a:theme xmlns:a="http://schemas.openxmlformats.org/drawingml/2006/main" name="Office Theme">
+  <a:themeElements>
+    <a:clrScheme name="Office">
+      <a:dk1>
+        <a:sysClr val="windowText" lastClr="000000"/>
+      </a:dk1>
+      <a:lt1>
+        <a:sysClr val="window" lastClr="FFFFFF"/>
+      </a:lt1>
+      <a:dk2>
+        <a:srgbClr val="0E2841"/>
+      </a:dk2>
+      <a:lt2>
+        <a:srgbClr val="E8E8E8"/>
+      </a:lt2>
+      <a:accent1>
+        <a:srgbClr val="156082"/>
+      </a:accent1>
+      <a:accent2>
+        <a:srgbClr val="E97132"/>
+      </a:accent2>
+      <a:accent3>
+        <a:srgbClr val="196B24"/>
+      </a:accent3>
+      <a:accent4>
+        <a:srgbClr val="0F9ED5"/>
+      </a:accent4>
+      <a:accent5>
+        <a:srgbClr val="A02B93"/>
+      </a:accent5>
+      <a:accent6>
+        <a:srgbClr val="4EA72E"/>
+      </a:accent6>
+      <a:hlink>
+        <a:srgbClr val="467886"/>
+      </a:hlink>
+      <a:folHlink>
+        <a:srgbClr val="96607D"/>
+      </a:folHlink>
+    </a:clrScheme>
+    <a:fontScheme name="Office">
+      <a:majorFont>
+        <a:latin typeface="Aptos Display" panose="02110004020202020204"/>
+        <a:ea typeface=""/>
+        <a:cs typeface=""/>
+        <a:font script="Jpan" typeface="游ゴシック Light"/>
+        <a:font script="Hang" typeface="맑은 고딕"/>
+        <a:font script="Hans" typeface="等线 Light"/>
+        <a:font script="Hant" typeface="新細明體"/>
+        <a:font script="Arab" typeface="Times New Roman"/>
+        <a:font script="Hebr" typeface="Times New Roman"/>
+        <a:font script="Thai" typeface="Angsana New"/>
+        <a:font script="Ethi" typeface="Nyala"/>
+        <a:font script="Beng" typeface="Vrinda"/>
+        <a:font script="Gujr" typeface="Shruti"/>
+        <a:font script="Khmr" typeface="MoolBoran"/>
+        <a:font script="Knda" typeface="Tunga"/>
+        <a:font script="Guru" typeface="Raavi"/>
+        <a:font script="Cans" typeface="Euphemia"/>
+        <a:font script="Cher" typeface="Plantagenet Cherokee"/>
+        <a:font script="Yiii" typeface="Microsoft Yi Baiti"/>
+        <a:font script="Tibt" typeface="Microsoft Himalaya"/>
+        <a:font script="Thaa" typeface="MV Boli"/>
+        <a:font script="Deva" typeface="Mangal"/>
+        <a:font script="Telu" typeface="Gautami"/>
+        <a:font script="Taml" typeface="Latha"/>
+        <a:font script="Syrc" typeface="Estrangelo Edessa"/>
+        <a:font script="Orya" typeface="Kalinga"/>
+        <a:font script="Mlym" typeface="Kartika"/>
+        <a:font script="Laoo" typeface="DokChampa"/>
+        <a:font script="Sinh" typeface="Iskoola Pota"/>
+        <a:font script="Mong" typeface="Mongolian Baiti"/>
+        <a:font script="Viet" typeface="Times New Roman"/>
+        <a:font script="Uigh" typeface="Microsoft Uighur"/>
+        <a:font script="Geor" typeface="Sylfaen"/>
+        <a:font script="Armn" typeface="Arial"/>
+        <a:font script="Bugi" typeface="Leelawadee UI"/>
+        <a:font script="Bopo" typeface="Microsoft JhengHei"/>
+        <a:font script="Java" typeface="Javanese Text"/>
+        <a:font script="Lisu" typeface="Segoe UI"/>
+        <a:font script="Mymr" typeface="Myanmar Text"/>
+        <a:font script="Nkoo" typeface="Ebrima"/>
+        <a:font script="Olck" typeface="Nirmala UI"/>
+        <a:font script="Osma" typeface="Ebrima"/>
+        <a:font script="Phag" typeface="Phagspa"/>
+        <a:font script="Syrn" typeface="Estrangelo Edessa"/>
+        <a:font script="Syrj" typeface="Estrangelo Edessa"/>
+        <a:font script="Syre" typeface="Estrangelo Edessa"/>
+        <a:font script="Sora" typeface="Nirmala UI"/>
+        <a:font script="Tale" typeface="Microsoft Tai Le"/>
+        <a:font script="Talu" typeface="Microsoft New Tai Lue"/>
+        <a:font script="Tfng" typeface="Ebrima"/>
+      </a:majorFont>
+      <a:minorFont>
+        <a:latin typeface="Aptos" panose="02110004020202020204"/>
+        <a:ea typeface=""/>
+        <a:cs typeface=""/>
+        <a:font script="Jpan" typeface="游ゴシック"/>
+        <a:font script="Hang" typeface="맑은 고딕"/>
+        <a:font script="Hans" typeface="等线"/>
+        <a:font script="Hant" typeface="新細明體"/>
+        <a:font script="Arab" typeface="Arial"/>
+        <a:font script="Hebr" typeface="Arial"/>
+        <a:font script="Thai" typeface="Cordia New"/>
+        <a:font script="Ethi" typeface="Nyala"/>
+        <a:font script="Beng" typeface="Vrinda"/>
+        <a:font script="Gujr" typeface="Shruti"/>
+        <a:font script="Khmr" typeface="DaunPenh"/>
+        <a:font script="Knda" typeface="Tunga"/>
+        <a:font script="Guru" typeface="Raavi"/>
+        <a:font script="Cans" typeface="Euphemia"/>
+        <a:font script="Cher" typeface="Plantagenet Cherokee"/>
+        <a:font script="Yiii" typeface="Microsoft Yi Baiti"/>
+        <a:font script="Tibt" typeface="Microsoft Himalaya"/>
+        <a:font script="Thaa" typeface="MV Boli"/>
+        <a:font script="Deva" typeface="Mangal"/>
+        <a:font script="Telu" typeface="Gautami"/>
+        <a:font script="Taml" typeface="Latha"/>
+        <a:font script="Syrc" typeface="Estrangelo Edessa"/>
+        <a:font script="Orya" typeface="Kalinga"/>
+        <a:font script="Mlym" typeface="Kartika"/>
+        <a:font script="Laoo" typeface="DokChampa"/>
+        <a:font script="Sinh" typeface="Iskoola Pota"/>
+        <a:font script="Mong" typeface="Mongolian Baiti"/>
+        <a:font script="Viet" typeface="Arial"/>
+        <a:font script="Uigh" typeface="Microsoft Uighur"/>
+        <a:font script="Geor" typeface="Sylfaen"/>
+        <a:font script="Armn" typeface="Arial"/>
+        <a:font script="Bugi" typeface="Leelawadee UI"/>
+        <a:font script="Bopo" typeface="Microsoft JhengHei"/>
+        <a:font script="Java" typeface="Javanese Text"/>
+        <a:font script="Lisu" typeface="Segoe UI"/>
+        <a:font script="Mymr" typeface="Myanmar Text"/>
+        <a:font script="Nkoo" typeface="Ebrima"/>
+        <a:font script="Olck" typeface="Nirmala UI"/>
+        <a:font script="Osma" typeface="Ebrima"/>
+        <a:font script="Phag" typeface="Phagspa"/>
+        <a:font script="Syrn" typeface="Estrangelo Edessa"/>
+        <a:font script="Syrj" typeface="Estrangelo Edessa"/>
+        <a:font script="Syre" typeface="Estrangelo Edessa"/>
+        <a:font script="Sora" typeface="Nirmala UI"/>
+        <a:font script="Tale" typeface="Microsoft Tai Le"/>
+        <a:font script="Talu" typeface="Microsoft New Tai Lue"/>
+        <a:font script="Tfng" typeface="Ebrima"/>
+      </a:minorFont>
+    </a:fontScheme>
+    <a:fmtScheme name="Office">
+      <a:fillStyleLst>
+        <a:solidFill>
+          <a:schemeClr val="phClr"/>
+        </a:solidFill>
+        <a:gradFill rotWithShape="1">
+          <a:gsLst>
+            <a:gs pos="0">
+              <a:schemeClr val="phClr">
+                <a:lumMod val="110000"/>
+                <a:satMod val="105000"/>
+                <a:tint val="67000"/>
+              </a:schemeClr>
+            </a:gs>
+            <a:gs pos="50000">
+              <a:schemeClr val="phClr">
+                <a:lumMod val="105000"/>
+                <a:satMod val="103000"/>
+                <a:tint val="73000"/>
+              </a:schemeClr>
+            </a:gs>
+            <a:gs pos="100000">
+              <a:schemeClr val="phClr">
+                <a:lumMod val="105000"/>
+                <a:satMod val="109000"/>
+                <a:tint val="81000"/>
+              </a:schemeClr>
+            </a:gs>
+          </a:gsLst>
+          <a:lin ang="5400000" scaled="0"/>
+        </a:gradFill>
+        <a:gradFill rotWithShape="1">
+          <a:gsLst>
+            <a:gs pos="0">
+              <a:schemeClr val="phClr">
+                <a:satMod val="103000"/>
+                <a:lumMod val="102000"/>
+                <a:tint val="94000"/>
+              </a:schemeClr>
+            </a:gs>
+            <a:gs pos="50000">
+              <a:schemeClr val="phClr">
+                <a:satMod val="110000"/>
+                <a:lumMod val="100000"/>
+                <a:shade val="100000"/>
+              </a:schemeClr>
+            </a:gs>
+            <a:gs pos="100000">
+              <a:schemeClr val="phClr">
+                <a:lumMod val="99000"/>
+                <a:satMod val="120000"/>
+                <a:shade val="78000"/>
+              </a:schemeClr>
+            </a:gs>
+          </a:gsLst>
+          <a:lin ang="5400000" scaled="0"/>
+        </a:gradFill>
+      </a:fillStyleLst>
+      <a:lnStyleLst>
+        <a:ln w="12700" cap="flat" cmpd="sng" algn="ctr">
+          <a:solidFill>
+            <a:schemeClr val="phClr"/>
+          </a:solidFill>
+          <a:prstDash val="solid"/>
+          <a:miter lim="800000"/>
+        </a:ln>
+        <a:ln w="19050" cap="flat" cmpd="sng" algn="ctr">
+          <a:solidFill>
+            <a:schemeClr val="phClr"/>
+          </a:solidFill>
+          <a:prstDash val="solid"/>
+          <a:miter lim="800000"/>
+        </a:ln>
+        <a:ln w="25400" cap="flat" cmpd="sng" algn="ctr">
+          <a:solidFill>
+            <a:schemeClr val="phClr"/>
+          </a:solidFill>
+          <a:prstDash val="solid"/>
+          <a:miter lim="800000"/>
+        </a:ln>
+      </a:lnStyleLst>
+      <a:effectStyleLst>
+        <a:effectStyle>
+          <a:effectLst/>
+        </a:effectStyle>
+        <a:effectStyle>
+          <a:effectLst/>
+        </a:effectStyle>
+        <a:effectStyle>
+          <a:effectLst>
+            <a:outerShdw blurRad="57150" dist="19050" dir="5400000" algn="ctr" rotWithShape="0">
+              <a:srgbClr val="000000">
+                <a:alpha val="63000"/>
+              </a:srgbClr>
+            </a:outerShdw>
+          </a:effectLst>
+        </a:effectStyle>
+      </a:effectStyleLst>
+      <a:bgFillStyleLst>
+        <a:solidFill>
+          <a:schemeClr val="phClr"/>
+        </a:solidFill>
+        <a:solidFill>
+          <a:schemeClr val="phClr">
+            <a:tint val="95000"/>
+            <a:satMod val="170000"/>
+          </a:schemeClr>
+        </a:solidFill>
+        <a:gradFill rotWithShape="1">
+          <a:gsLst>
+            <a:gs pos="0">
+              <a:schemeClr val="phClr">
+                <a:tint val="93000"/>
+                <a:satMod val="150000"/>
+                <a:shade val="98000"/>
+                <a:lumMod val="102000"/>
+              </a:schemeClr>
+            </a:gs>
+            <a:gs pos="50000">
+              <a:schemeClr val="phClr">
+                <a:tint val="98000"/>
+                <a:satMod val="130000"/>
+                <a:shade val="90000"/>
+                <a:lumMod val="103000"/>
+              </a:schemeClr>
+            </a:gs>
+            <a:gs pos="100000">
+              <a:schemeClr val="phClr">
+                <a:shade val="63000"/>
+                <a:satMod val="120000"/>
+              </a:schemeClr>
+            </a:gs>
+          </a:gsLst>
+          <a:lin ang="5400000" scaled="0"/>
+        </a:gradFill>
+      </a:bgFillStyleLst>
+    </a:fmtScheme>
+  </a:themeElements>
+  <a:objectDefaults>
+    <a:lnDef>
+      <a:spPr/>
+      <a:bodyPr/>
+      <a:lstStyle/>
+      <a:style>
+        <a:lnRef idx="2">
+          <a:schemeClr val="accent1"/>
+        </a:lnRef>
+        <a:fillRef idx="0">
+          <a:schemeClr val="accent1"/>
+        </a:fillRef>
+        <a:effectRef idx="1">
+          <a:schemeClr val="accent1"/>
+        </a:effectRef>
+        <a:fontRef idx="minor">
+          <a:schemeClr val="tx1"/>
+        </a:fontRef>
+      </a:style>
+    </a:lnDef>
+  </a:objectDefaults>
+  <a:extraClrSchemeLst/>
+  <a:extLst>
+    <a:ext uri="{05A4C25C-085E-4340-85A3-A5531E510DB2}">
+      <thm15:themeFamily xmlns:thm15="http://schemas.microsoft.com/office/thememl/2012/main" name="Office Theme" id="{2E142A2C-CD16-42D6-873A-C26D2A0506FA}" vid="{1BDDFF52-6CD6-40A5-AB3C-68EB2F1E4D0A}"/>
+    </a:ext>
+  </a:extLst>
+</a:theme>
+</file>
+
+<file path=docMetadata/LabelInfo.xml><?xml version="1.0" encoding="utf-8"?>
+<clbl:labelList xmlns:clbl="http://schemas.microsoft.com/office/2020/mipLabelMetadata">
+  <clbl:label id="{f42aa342-8706-4288-bd11-ebb85995028c}" enabled="1" method="Standard" siteId="{72f988bf-86f1-41af-91ab-2d7cd011db47}" contentBits="0" removed="0"/>
+</clbl:labelList>
 </file>
</xml_diff>